<commit_message>
FP-Vortrag, Iteration nummero zwo
</commit_message>
<xml_diff>
--- a/GPS auf Rädern (FP).pptx
+++ b/GPS auf Rädern (FP).pptx
@@ -5,7 +5,7 @@
     <p:sldMasterId id="2147483684" r:id="rId1"/>
   </p:sldMasterIdLst>
   <p:notesMasterIdLst>
-    <p:notesMasterId r:id="rId26"/>
+    <p:notesMasterId r:id="rId30"/>
   </p:notesMasterIdLst>
   <p:sldIdLst>
     <p:sldId id="256" r:id="rId2"/>
@@ -25,13 +25,17 @@
     <p:sldId id="268" r:id="rId16"/>
     <p:sldId id="269" r:id="rId17"/>
     <p:sldId id="271" r:id="rId18"/>
-    <p:sldId id="278" r:id="rId19"/>
-    <p:sldId id="272" r:id="rId20"/>
-    <p:sldId id="279" r:id="rId21"/>
-    <p:sldId id="273" r:id="rId22"/>
-    <p:sldId id="275" r:id="rId23"/>
-    <p:sldId id="276" r:id="rId24"/>
-    <p:sldId id="277" r:id="rId25"/>
+    <p:sldId id="283" r:id="rId19"/>
+    <p:sldId id="282" r:id="rId20"/>
+    <p:sldId id="278" r:id="rId21"/>
+    <p:sldId id="284" r:id="rId22"/>
+    <p:sldId id="272" r:id="rId23"/>
+    <p:sldId id="285" r:id="rId24"/>
+    <p:sldId id="279" r:id="rId25"/>
+    <p:sldId id="273" r:id="rId26"/>
+    <p:sldId id="276" r:id="rId27"/>
+    <p:sldId id="286" r:id="rId28"/>
+    <p:sldId id="277" r:id="rId29"/>
   </p:sldIdLst>
   <p:sldSz cx="9144000" cy="6858000" type="screen4x3"/>
   <p:notesSz cx="6858000" cy="9144000"/>
@@ -215,7 +219,7 @@
           <a:p>
             <a:fld id="{4738F50F-2F8D-4139-8A8F-A2E8B7C7F0FF}" type="datetimeFigureOut">
               <a:rPr lang="de-DE" smtClean="0"/>
-              <a:t>15-07-17</a:t>
+              <a:t>15-07-19</a:t>
             </a:fld>
             <a:endParaRPr lang="de-DE"/>
           </a:p>
@@ -555,11 +559,7 @@
             </a:r>
             <a:r>
               <a:rPr lang="en-US" baseline="0" dirty="0" err="1" smtClean="0"/>
-              <a:t>f</a:t>
-            </a:r>
-            <a:r>
-              <a:rPr lang="en-US" baseline="0" dirty="0" err="1" smtClean="0"/>
-              <a:t>ür</a:t>
+              <a:t>für</a:t>
             </a:r>
             <a:r>
               <a:rPr lang="en-US" baseline="0" dirty="0" smtClean="0"/>
@@ -696,6 +696,98 @@
     <p:extLst>
       <p:ext uri="{BB962C8B-B14F-4D97-AF65-F5344CB8AC3E}">
         <p14:creationId xmlns:p14="http://schemas.microsoft.com/office/powerpoint/2010/main" val="1817823592"/>
+      </p:ext>
+    </p:extLst>
+  </p:cSld>
+  <p:clrMapOvr>
+    <a:masterClrMapping/>
+  </p:clrMapOvr>
+</p:notes>
+</file>
+
+<file path=ppt/notesSlides/notesSlide10.xml><?xml version="1.0" encoding="utf-8"?>
+<p:notes xmlns:a="http://schemas.openxmlformats.org/drawingml/2006/main" xmlns:r="http://schemas.openxmlformats.org/officeDocument/2006/relationships" xmlns:p="http://schemas.openxmlformats.org/presentationml/2006/main">
+  <p:cSld>
+    <p:spTree>
+      <p:nvGrpSpPr>
+        <p:cNvPr id="1" name=""/>
+        <p:cNvGrpSpPr/>
+        <p:nvPr/>
+      </p:nvGrpSpPr>
+      <p:grpSpPr>
+        <a:xfrm>
+          <a:off x="0" y="0"/>
+          <a:ext cx="0" cy="0"/>
+          <a:chOff x="0" y="0"/>
+          <a:chExt cx="0" cy="0"/>
+        </a:xfrm>
+      </p:grpSpPr>
+      <p:sp>
+        <p:nvSpPr>
+          <p:cNvPr id="2" name="Slide Image Placeholder 1"/>
+          <p:cNvSpPr>
+            <a:spLocks noGrp="1" noRot="1" noChangeAspect="1"/>
+          </p:cNvSpPr>
+          <p:nvPr>
+            <p:ph type="sldImg"/>
+          </p:nvPr>
+        </p:nvSpPr>
+        <p:spPr/>
+      </p:sp>
+      <p:sp>
+        <p:nvSpPr>
+          <p:cNvPr id="3" name="Notes Placeholder 2"/>
+          <p:cNvSpPr>
+            <a:spLocks noGrp="1"/>
+          </p:cNvSpPr>
+          <p:nvPr>
+            <p:ph type="body" idx="1"/>
+          </p:nvPr>
+        </p:nvSpPr>
+        <p:spPr/>
+        <p:txBody>
+          <a:bodyPr/>
+          <a:lstStyle/>
+          <a:p>
+            <a:r>
+              <a:rPr lang="en-US"/>
+              <a:t>Probleme</a:t>
+            </a:r>
+            <a:r>
+              <a:rPr lang="en-US" baseline="0"/>
+              <a:t> ansprechen: Navigation und Hinderniserkennung/Zusammenspiel</a:t>
+            </a:r>
+            <a:endParaRPr lang="en-US"/>
+          </a:p>
+        </p:txBody>
+      </p:sp>
+      <p:sp>
+        <p:nvSpPr>
+          <p:cNvPr id="4" name="Slide Number Placeholder 3"/>
+          <p:cNvSpPr>
+            <a:spLocks noGrp="1"/>
+          </p:cNvSpPr>
+          <p:nvPr>
+            <p:ph type="sldNum" sz="quarter" idx="10"/>
+          </p:nvPr>
+        </p:nvSpPr>
+        <p:spPr/>
+        <p:txBody>
+          <a:bodyPr/>
+          <a:lstStyle/>
+          <a:p>
+            <a:fld id="{3C1F6DE6-85C7-4B7B-9736-3E2B9216E239}" type="slidenum">
+              <a:rPr lang="de-DE" smtClean="0"/>
+              <a:t>25</a:t>
+            </a:fld>
+            <a:endParaRPr lang="de-DE"/>
+          </a:p>
+        </p:txBody>
+      </p:sp>
+    </p:spTree>
+    <p:extLst>
+      <p:ext uri="{BB962C8B-B14F-4D97-AF65-F5344CB8AC3E}">
+        <p14:creationId xmlns:p14="http://schemas.microsoft.com/office/powerpoint/2010/main" val="3207380738"/>
       </p:ext>
     </p:extLst>
   </p:cSld>
@@ -764,11 +856,7 @@
             </a:r>
             <a:r>
               <a:rPr lang="en-US" baseline="0" smtClean="0"/>
-              <a:t> </a:t>
-            </a:r>
-            <a:r>
-              <a:rPr lang="en-US" baseline="0" smtClean="0"/>
-              <a:t>über GPIO/UART/I2C bus. Was ist ein Pi überhaupt?</a:t>
+              <a:t> über GPIO/UART/I2C bus. Was ist ein Pi überhaupt?</a:t>
             </a:r>
           </a:p>
           <a:p>
@@ -1032,6 +1120,443 @@
     <p:extLst>
       <p:ext uri="{BB962C8B-B14F-4D97-AF65-F5344CB8AC3E}">
         <p14:creationId xmlns:p14="http://schemas.microsoft.com/office/powerpoint/2010/main" val="3150219203"/>
+      </p:ext>
+    </p:extLst>
+  </p:cSld>
+  <p:clrMapOvr>
+    <a:masterClrMapping/>
+  </p:clrMapOvr>
+</p:notes>
+</file>
+
+<file path=ppt/notesSlides/notesSlide5.xml><?xml version="1.0" encoding="utf-8"?>
+<p:notes xmlns:a="http://schemas.openxmlformats.org/drawingml/2006/main" xmlns:r="http://schemas.openxmlformats.org/officeDocument/2006/relationships" xmlns:p="http://schemas.openxmlformats.org/presentationml/2006/main">
+  <p:cSld>
+    <p:spTree>
+      <p:nvGrpSpPr>
+        <p:cNvPr id="1" name=""/>
+        <p:cNvGrpSpPr/>
+        <p:nvPr/>
+      </p:nvGrpSpPr>
+      <p:grpSpPr>
+        <a:xfrm>
+          <a:off x="0" y="0"/>
+          <a:ext cx="0" cy="0"/>
+          <a:chOff x="0" y="0"/>
+          <a:chExt cx="0" cy="0"/>
+        </a:xfrm>
+      </p:grpSpPr>
+      <p:sp>
+        <p:nvSpPr>
+          <p:cNvPr id="2" name="Slide Image Placeholder 1"/>
+          <p:cNvSpPr>
+            <a:spLocks noGrp="1" noRot="1" noChangeAspect="1"/>
+          </p:cNvSpPr>
+          <p:nvPr>
+            <p:ph type="sldImg"/>
+          </p:nvPr>
+        </p:nvSpPr>
+        <p:spPr/>
+      </p:sp>
+      <p:sp>
+        <p:nvSpPr>
+          <p:cNvPr id="3" name="Notes Placeholder 2"/>
+          <p:cNvSpPr>
+            <a:spLocks noGrp="1"/>
+          </p:cNvSpPr>
+          <p:nvPr>
+            <p:ph type="body" idx="1"/>
+          </p:nvPr>
+        </p:nvSpPr>
+        <p:spPr/>
+        <p:txBody>
+          <a:bodyPr/>
+          <a:lstStyle/>
+          <a:p>
+            <a:r>
+              <a:rPr lang="en-US"/>
+              <a:t>TODO: tba</a:t>
+            </a:r>
+          </a:p>
+        </p:txBody>
+      </p:sp>
+      <p:sp>
+        <p:nvSpPr>
+          <p:cNvPr id="4" name="Slide Number Placeholder 3"/>
+          <p:cNvSpPr>
+            <a:spLocks noGrp="1"/>
+          </p:cNvSpPr>
+          <p:nvPr>
+            <p:ph type="sldNum" sz="quarter" idx="10"/>
+          </p:nvPr>
+        </p:nvSpPr>
+        <p:spPr/>
+        <p:txBody>
+          <a:bodyPr/>
+          <a:lstStyle/>
+          <a:p>
+            <a:fld id="{3C1F6DE6-85C7-4B7B-9736-3E2B9216E239}" type="slidenum">
+              <a:rPr lang="de-DE" smtClean="0"/>
+              <a:t>18</a:t>
+            </a:fld>
+            <a:endParaRPr lang="de-DE"/>
+          </a:p>
+        </p:txBody>
+      </p:sp>
+    </p:spTree>
+    <p:extLst>
+      <p:ext uri="{BB962C8B-B14F-4D97-AF65-F5344CB8AC3E}">
+        <p14:creationId xmlns:p14="http://schemas.microsoft.com/office/powerpoint/2010/main" val="3832613316"/>
+      </p:ext>
+    </p:extLst>
+  </p:cSld>
+  <p:clrMapOvr>
+    <a:masterClrMapping/>
+  </p:clrMapOvr>
+</p:notes>
+</file>
+
+<file path=ppt/notesSlides/notesSlide6.xml><?xml version="1.0" encoding="utf-8"?>
+<p:notes xmlns:a="http://schemas.openxmlformats.org/drawingml/2006/main" xmlns:r="http://schemas.openxmlformats.org/officeDocument/2006/relationships" xmlns:p="http://schemas.openxmlformats.org/presentationml/2006/main">
+  <p:cSld>
+    <p:spTree>
+      <p:nvGrpSpPr>
+        <p:cNvPr id="1" name=""/>
+        <p:cNvGrpSpPr/>
+        <p:nvPr/>
+      </p:nvGrpSpPr>
+      <p:grpSpPr>
+        <a:xfrm>
+          <a:off x="0" y="0"/>
+          <a:ext cx="0" cy="0"/>
+          <a:chOff x="0" y="0"/>
+          <a:chExt cx="0" cy="0"/>
+        </a:xfrm>
+      </p:grpSpPr>
+      <p:sp>
+        <p:nvSpPr>
+          <p:cNvPr id="2" name="Slide Image Placeholder 1"/>
+          <p:cNvSpPr>
+            <a:spLocks noGrp="1" noRot="1" noChangeAspect="1"/>
+          </p:cNvSpPr>
+          <p:nvPr>
+            <p:ph type="sldImg"/>
+          </p:nvPr>
+        </p:nvSpPr>
+        <p:spPr/>
+      </p:sp>
+      <p:sp>
+        <p:nvSpPr>
+          <p:cNvPr id="3" name="Notes Placeholder 2"/>
+          <p:cNvSpPr>
+            <a:spLocks noGrp="1"/>
+          </p:cNvSpPr>
+          <p:nvPr>
+            <p:ph type="body" idx="1"/>
+          </p:nvPr>
+        </p:nvSpPr>
+        <p:spPr/>
+        <p:txBody>
+          <a:bodyPr/>
+          <a:lstStyle/>
+          <a:p>
+            <a:r>
+              <a:rPr lang="en-US"/>
+              <a:t>TODO: tba</a:t>
+            </a:r>
+          </a:p>
+        </p:txBody>
+      </p:sp>
+      <p:sp>
+        <p:nvSpPr>
+          <p:cNvPr id="4" name="Slide Number Placeholder 3"/>
+          <p:cNvSpPr>
+            <a:spLocks noGrp="1"/>
+          </p:cNvSpPr>
+          <p:nvPr>
+            <p:ph type="sldNum" sz="quarter" idx="10"/>
+          </p:nvPr>
+        </p:nvSpPr>
+        <p:spPr/>
+        <p:txBody>
+          <a:bodyPr/>
+          <a:lstStyle/>
+          <a:p>
+            <a:fld id="{3C1F6DE6-85C7-4B7B-9736-3E2B9216E239}" type="slidenum">
+              <a:rPr lang="de-DE" smtClean="0"/>
+              <a:t>19</a:t>
+            </a:fld>
+            <a:endParaRPr lang="de-DE"/>
+          </a:p>
+        </p:txBody>
+      </p:sp>
+    </p:spTree>
+    <p:extLst>
+      <p:ext uri="{BB962C8B-B14F-4D97-AF65-F5344CB8AC3E}">
+        <p14:creationId xmlns:p14="http://schemas.microsoft.com/office/powerpoint/2010/main" val="2862508042"/>
+      </p:ext>
+    </p:extLst>
+  </p:cSld>
+  <p:clrMapOvr>
+    <a:masterClrMapping/>
+  </p:clrMapOvr>
+</p:notes>
+</file>
+
+<file path=ppt/notesSlides/notesSlide7.xml><?xml version="1.0" encoding="utf-8"?>
+<p:notes xmlns:a="http://schemas.openxmlformats.org/drawingml/2006/main" xmlns:r="http://schemas.openxmlformats.org/officeDocument/2006/relationships" xmlns:p="http://schemas.openxmlformats.org/presentationml/2006/main">
+  <p:cSld>
+    <p:spTree>
+      <p:nvGrpSpPr>
+        <p:cNvPr id="1" name=""/>
+        <p:cNvGrpSpPr/>
+        <p:nvPr/>
+      </p:nvGrpSpPr>
+      <p:grpSpPr>
+        <a:xfrm>
+          <a:off x="0" y="0"/>
+          <a:ext cx="0" cy="0"/>
+          <a:chOff x="0" y="0"/>
+          <a:chExt cx="0" cy="0"/>
+        </a:xfrm>
+      </p:grpSpPr>
+      <p:sp>
+        <p:nvSpPr>
+          <p:cNvPr id="2" name="Slide Image Placeholder 1"/>
+          <p:cNvSpPr>
+            <a:spLocks noGrp="1" noRot="1" noChangeAspect="1"/>
+          </p:cNvSpPr>
+          <p:nvPr>
+            <p:ph type="sldImg"/>
+          </p:nvPr>
+        </p:nvSpPr>
+        <p:spPr/>
+      </p:sp>
+      <p:sp>
+        <p:nvSpPr>
+          <p:cNvPr id="3" name="Notes Placeholder 2"/>
+          <p:cNvSpPr>
+            <a:spLocks noGrp="1"/>
+          </p:cNvSpPr>
+          <p:nvPr>
+            <p:ph type="body" idx="1"/>
+          </p:nvPr>
+        </p:nvSpPr>
+        <p:spPr/>
+        <p:txBody>
+          <a:bodyPr/>
+          <a:lstStyle/>
+          <a:p>
+            <a:r>
+              <a:rPr lang="en-US"/>
+              <a:t>TODO: tba</a:t>
+            </a:r>
+          </a:p>
+        </p:txBody>
+      </p:sp>
+      <p:sp>
+        <p:nvSpPr>
+          <p:cNvPr id="4" name="Slide Number Placeholder 3"/>
+          <p:cNvSpPr>
+            <a:spLocks noGrp="1"/>
+          </p:cNvSpPr>
+          <p:nvPr>
+            <p:ph type="sldNum" sz="quarter" idx="10"/>
+          </p:nvPr>
+        </p:nvSpPr>
+        <p:spPr/>
+        <p:txBody>
+          <a:bodyPr/>
+          <a:lstStyle/>
+          <a:p>
+            <a:fld id="{3C1F6DE6-85C7-4B7B-9736-3E2B9216E239}" type="slidenum">
+              <a:rPr lang="de-DE" smtClean="0"/>
+              <a:t>21</a:t>
+            </a:fld>
+            <a:endParaRPr lang="de-DE"/>
+          </a:p>
+        </p:txBody>
+      </p:sp>
+    </p:spTree>
+    <p:extLst>
+      <p:ext uri="{BB962C8B-B14F-4D97-AF65-F5344CB8AC3E}">
+        <p14:creationId xmlns:p14="http://schemas.microsoft.com/office/powerpoint/2010/main" val="3202572473"/>
+      </p:ext>
+    </p:extLst>
+  </p:cSld>
+  <p:clrMapOvr>
+    <a:masterClrMapping/>
+  </p:clrMapOvr>
+</p:notes>
+</file>
+
+<file path=ppt/notesSlides/notesSlide8.xml><?xml version="1.0" encoding="utf-8"?>
+<p:notes xmlns:a="http://schemas.openxmlformats.org/drawingml/2006/main" xmlns:r="http://schemas.openxmlformats.org/officeDocument/2006/relationships" xmlns:p="http://schemas.openxmlformats.org/presentationml/2006/main">
+  <p:cSld>
+    <p:spTree>
+      <p:nvGrpSpPr>
+        <p:cNvPr id="1" name=""/>
+        <p:cNvGrpSpPr/>
+        <p:nvPr/>
+      </p:nvGrpSpPr>
+      <p:grpSpPr>
+        <a:xfrm>
+          <a:off x="0" y="0"/>
+          <a:ext cx="0" cy="0"/>
+          <a:chOff x="0" y="0"/>
+          <a:chExt cx="0" cy="0"/>
+        </a:xfrm>
+      </p:grpSpPr>
+      <p:sp>
+        <p:nvSpPr>
+          <p:cNvPr id="2" name="Slide Image Placeholder 1"/>
+          <p:cNvSpPr>
+            <a:spLocks noGrp="1" noRot="1" noChangeAspect="1"/>
+          </p:cNvSpPr>
+          <p:nvPr>
+            <p:ph type="sldImg"/>
+          </p:nvPr>
+        </p:nvSpPr>
+        <p:spPr/>
+      </p:sp>
+      <p:sp>
+        <p:nvSpPr>
+          <p:cNvPr id="3" name="Notes Placeholder 2"/>
+          <p:cNvSpPr>
+            <a:spLocks noGrp="1"/>
+          </p:cNvSpPr>
+          <p:nvPr>
+            <p:ph type="body" idx="1"/>
+          </p:nvPr>
+        </p:nvSpPr>
+        <p:spPr/>
+        <p:txBody>
+          <a:bodyPr/>
+          <a:lstStyle/>
+          <a:p>
+            <a:r>
+              <a:rPr lang="en-US"/>
+              <a:t>TODO:</a:t>
+            </a:r>
+            <a:r>
+              <a:rPr lang="en-US" baseline="0"/>
+              <a:t> tba</a:t>
+            </a:r>
+            <a:endParaRPr lang="en-US"/>
+          </a:p>
+        </p:txBody>
+      </p:sp>
+      <p:sp>
+        <p:nvSpPr>
+          <p:cNvPr id="4" name="Slide Number Placeholder 3"/>
+          <p:cNvSpPr>
+            <a:spLocks noGrp="1"/>
+          </p:cNvSpPr>
+          <p:nvPr>
+            <p:ph type="sldNum" sz="quarter" idx="10"/>
+          </p:nvPr>
+        </p:nvSpPr>
+        <p:spPr/>
+        <p:txBody>
+          <a:bodyPr/>
+          <a:lstStyle/>
+          <a:p>
+            <a:fld id="{3C1F6DE6-85C7-4B7B-9736-3E2B9216E239}" type="slidenum">
+              <a:rPr lang="de-DE" smtClean="0"/>
+              <a:t>23</a:t>
+            </a:fld>
+            <a:endParaRPr lang="de-DE"/>
+          </a:p>
+        </p:txBody>
+      </p:sp>
+    </p:spTree>
+    <p:extLst>
+      <p:ext uri="{BB962C8B-B14F-4D97-AF65-F5344CB8AC3E}">
+        <p14:creationId xmlns:p14="http://schemas.microsoft.com/office/powerpoint/2010/main" val="450506952"/>
+      </p:ext>
+    </p:extLst>
+  </p:cSld>
+  <p:clrMapOvr>
+    <a:masterClrMapping/>
+  </p:clrMapOvr>
+</p:notes>
+</file>
+
+<file path=ppt/notesSlides/notesSlide9.xml><?xml version="1.0" encoding="utf-8"?>
+<p:notes xmlns:a="http://schemas.openxmlformats.org/drawingml/2006/main" xmlns:r="http://schemas.openxmlformats.org/officeDocument/2006/relationships" xmlns:p="http://schemas.openxmlformats.org/presentationml/2006/main">
+  <p:cSld>
+    <p:spTree>
+      <p:nvGrpSpPr>
+        <p:cNvPr id="1" name=""/>
+        <p:cNvGrpSpPr/>
+        <p:nvPr/>
+      </p:nvGrpSpPr>
+      <p:grpSpPr>
+        <a:xfrm>
+          <a:off x="0" y="0"/>
+          <a:ext cx="0" cy="0"/>
+          <a:chOff x="0" y="0"/>
+          <a:chExt cx="0" cy="0"/>
+        </a:xfrm>
+      </p:grpSpPr>
+      <p:sp>
+        <p:nvSpPr>
+          <p:cNvPr id="2" name="Slide Image Placeholder 1"/>
+          <p:cNvSpPr>
+            <a:spLocks noGrp="1" noRot="1" noChangeAspect="1"/>
+          </p:cNvSpPr>
+          <p:nvPr>
+            <p:ph type="sldImg"/>
+          </p:nvPr>
+        </p:nvSpPr>
+        <p:spPr/>
+      </p:sp>
+      <p:sp>
+        <p:nvSpPr>
+          <p:cNvPr id="3" name="Notes Placeholder 2"/>
+          <p:cNvSpPr>
+            <a:spLocks noGrp="1"/>
+          </p:cNvSpPr>
+          <p:nvPr>
+            <p:ph type="body" idx="1"/>
+          </p:nvPr>
+        </p:nvSpPr>
+        <p:spPr/>
+        <p:txBody>
+          <a:bodyPr/>
+          <a:lstStyle/>
+          <a:p>
+            <a:endParaRPr lang="en-US"/>
+          </a:p>
+        </p:txBody>
+      </p:sp>
+      <p:sp>
+        <p:nvSpPr>
+          <p:cNvPr id="4" name="Slide Number Placeholder 3"/>
+          <p:cNvSpPr>
+            <a:spLocks noGrp="1"/>
+          </p:cNvSpPr>
+          <p:nvPr>
+            <p:ph type="sldNum" sz="quarter" idx="10"/>
+          </p:nvPr>
+        </p:nvSpPr>
+        <p:spPr/>
+        <p:txBody>
+          <a:bodyPr/>
+          <a:lstStyle/>
+          <a:p>
+            <a:fld id="{3C1F6DE6-85C7-4B7B-9736-3E2B9216E239}" type="slidenum">
+              <a:rPr lang="de-DE" smtClean="0"/>
+              <a:t>24</a:t>
+            </a:fld>
+            <a:endParaRPr lang="de-DE"/>
+          </a:p>
+        </p:txBody>
+      </p:sp>
+    </p:spTree>
+    <p:extLst>
+      <p:ext uri="{BB962C8B-B14F-4D97-AF65-F5344CB8AC3E}">
+        <p14:creationId xmlns:p14="http://schemas.microsoft.com/office/powerpoint/2010/main" val="3374591116"/>
       </p:ext>
     </p:extLst>
   </p:cSld>
@@ -1289,7 +1814,7 @@
           <a:p>
             <a:fld id="{34CC48B3-263B-47F8-9D78-1B0D549FB54B}" type="datetime1">
               <a:rPr lang="de-DE" smtClean="0"/>
-              <a:t>15-07-17</a:t>
+              <a:t>15-07-19</a:t>
             </a:fld>
             <a:endParaRPr lang="de-DE"/>
           </a:p>
@@ -1512,7 +2037,7 @@
           <a:p>
             <a:fld id="{7CDDFC31-3C0F-4D92-AB4B-1AD4D9A10ABC}" type="datetime1">
               <a:rPr lang="de-DE" smtClean="0"/>
-              <a:t>15-07-17</a:t>
+              <a:t>15-07-19</a:t>
             </a:fld>
             <a:endParaRPr lang="de-DE"/>
           </a:p>
@@ -1792,7 +2317,7 @@
           <a:p>
             <a:fld id="{05659E21-C021-4B62-AF34-0D07F92ACDE4}" type="datetime1">
               <a:rPr lang="de-DE" smtClean="0"/>
-              <a:t>15-07-17</a:t>
+              <a:t>15-07-19</a:t>
             </a:fld>
             <a:endParaRPr lang="de-DE"/>
           </a:p>
@@ -1971,7 +2496,7 @@
           <a:p>
             <a:fld id="{8CD66B5F-F428-4AD5-AEA0-24CEBF2DCAA4}" type="datetime1">
               <a:rPr lang="de-DE" smtClean="0"/>
-              <a:t>15-07-17</a:t>
+              <a:t>15-07-19</a:t>
             </a:fld>
             <a:endParaRPr lang="de-DE"/>
           </a:p>
@@ -2329,7 +2854,7 @@
           <a:p>
             <a:fld id="{56CB83C8-E22B-4102-8876-C10FEED5964B}" type="datetime1">
               <a:rPr lang="de-DE" smtClean="0"/>
-              <a:t>15-07-17</a:t>
+              <a:t>15-07-19</a:t>
             </a:fld>
             <a:endParaRPr lang="de-DE"/>
           </a:p>
@@ -2616,7 +3141,7 @@
           <a:p>
             <a:fld id="{87CB9EA3-C823-4552-AC61-4C15664A8A8B}" type="datetime1">
               <a:rPr lang="de-DE" smtClean="0"/>
-              <a:t>15-07-17</a:t>
+              <a:t>15-07-19</a:t>
             </a:fld>
             <a:endParaRPr lang="de-DE"/>
           </a:p>
@@ -3038,7 +3563,7 @@
           <a:p>
             <a:fld id="{F0F7EFD9-C69E-4DB9-B1BF-3A8D786BEDA1}" type="datetime1">
               <a:rPr lang="de-DE" smtClean="0"/>
-              <a:t>15-07-17</a:t>
+              <a:t>15-07-19</a:t>
             </a:fld>
             <a:endParaRPr lang="de-DE"/>
           </a:p>
@@ -3153,7 +3678,7 @@
           <a:p>
             <a:fld id="{F0AD6F2C-E193-4B3D-825E-53DD21D209E9}" type="datetime1">
               <a:rPr lang="de-DE" smtClean="0"/>
-              <a:t>15-07-17</a:t>
+              <a:t>15-07-19</a:t>
             </a:fld>
             <a:endParaRPr lang="de-DE"/>
           </a:p>
@@ -3243,7 +3768,7 @@
           <a:p>
             <a:fld id="{4B63A411-9D65-458E-9D0C-3E9532339D84}" type="datetime1">
               <a:rPr lang="de-DE" smtClean="0"/>
-              <a:t>15-07-17</a:t>
+              <a:t>15-07-19</a:t>
             </a:fld>
             <a:endParaRPr lang="de-DE"/>
           </a:p>
@@ -3521,7 +4046,7 @@
           <a:p>
             <a:fld id="{77BCDE39-89E0-41D1-8BE3-F7CF8252B5D2}" type="datetime1">
               <a:rPr lang="de-DE" smtClean="0"/>
-              <a:t>15-07-17</a:t>
+              <a:t>15-07-19</a:t>
             </a:fld>
             <a:endParaRPr lang="de-DE"/>
           </a:p>
@@ -3887,7 +4412,7 @@
           <a:p>
             <a:fld id="{E1556925-8BB6-42C7-9C68-C67ACB224282}" type="datetime1">
               <a:rPr lang="de-DE" smtClean="0"/>
-              <a:t>15-07-17</a:t>
+              <a:t>15-07-19</a:t>
             </a:fld>
             <a:endParaRPr lang="de-DE"/>
           </a:p>
@@ -4324,7 +4849,7 @@
           <a:p>
             <a:fld id="{D4CF8A5A-F4ED-4F76-8BD7-110E91F4C05B}" type="datetime1">
               <a:rPr lang="de-DE" smtClean="0"/>
-              <a:t>15-07-17</a:t>
+              <a:t>15-07-19</a:t>
             </a:fld>
             <a:endParaRPr lang="de-DE"/>
           </a:p>
@@ -4756,11 +5281,7 @@
             <a:pPr algn="ctr"/>
             <a:r>
               <a:rPr lang="de-DE" dirty="0" smtClean="0"/>
-              <a:t>GPS auf </a:t>
-            </a:r>
-            <a:r>
-              <a:rPr lang="de-DE" dirty="0" smtClean="0"/>
-              <a:t>Rädern </a:t>
+              <a:t>GPS auf Rädern </a:t>
             </a:r>
             <a:br>
               <a:rPr lang="de-DE" dirty="0" smtClean="0"/>
@@ -7176,8 +7697,10 @@
                   </a:schemeClr>
                 </a:solidFill>
               </a:rPr>
-              <a:t>Urspr</a:t>
-            </a:r>
+              <a:t>Ursprüngliche Planung: Motorsteuerung über Mikrocontroller ATmega 168</a:t>
+            </a:r>
+          </a:p>
+          <a:p>
             <a:r>
               <a:rPr lang="de-DE" smtClean="0">
                 <a:solidFill>
@@ -7187,7 +7710,7 @@
                   </a:schemeClr>
                 </a:solidFill>
               </a:rPr>
-              <a:t>üngliche Planung: Motorsteuerung über Mikrocontroller ATmega 168</a:t>
+              <a:t>Programmierung in C</a:t>
             </a:r>
           </a:p>
           <a:p>
@@ -7200,10 +7723,11 @@
                   </a:schemeClr>
                 </a:solidFill>
               </a:rPr>
-              <a:t>Programmierung in C</a:t>
-            </a:r>
-          </a:p>
-          <a:p>
+              <a:t>Interface für Motoransteuerung</a:t>
+            </a:r>
+          </a:p>
+          <a:p>
+            <a:pPr lvl="1"/>
             <a:r>
               <a:rPr lang="de-DE" smtClean="0">
                 <a:solidFill>
@@ -7213,12 +7737,9 @@
                   </a:schemeClr>
                 </a:solidFill>
               </a:rPr>
-              <a:t>Interface für Motoransteuerung</a:t>
-            </a:r>
-          </a:p>
-          <a:p>
-            <a:pPr lvl="1"/>
-            <a:r>
+              <a:t>Umsetzung von high-level-Befehlen wie</a:t>
+            </a:r>
+            <a:br>
               <a:rPr lang="de-DE" smtClean="0">
                 <a:solidFill>
                   <a:schemeClr val="accent2">
@@ -7227,9 +7748,8 @@
                   </a:schemeClr>
                 </a:solidFill>
               </a:rPr>
-              <a:t>Umsetzung von high-level-Befehlen wie</a:t>
-            </a:r>
-            <a:br>
+            </a:br>
+            <a:r>
               <a:rPr lang="de-DE" smtClean="0">
                 <a:solidFill>
                   <a:schemeClr val="accent2">
@@ -7238,28 +7758,7 @@
                   </a:schemeClr>
                 </a:solidFill>
               </a:rPr>
-            </a:br>
-            <a:r>
-              <a:rPr lang="de-DE" smtClean="0">
-                <a:solidFill>
-                  <a:schemeClr val="accent2">
-                    <a:lumMod val="20000"/>
-                    <a:lumOff val="80000"/>
-                  </a:schemeClr>
-                </a:solidFill>
-              </a:rPr>
-              <a:t>»vorw</a:t>
-            </a:r>
-            <a:r>
-              <a:rPr lang="de-DE" smtClean="0">
-                <a:solidFill>
-                  <a:schemeClr val="accent2">
-                    <a:lumMod val="20000"/>
-                    <a:lumOff val="80000"/>
-                  </a:schemeClr>
-                </a:solidFill>
-              </a:rPr>
-              <a:t>ärts«, »lenken« in hardwareseitige Servosignale</a:t>
+              <a:t>»vorwärts«, »lenken« in hardwareseitige Servosignale</a:t>
             </a:r>
           </a:p>
           <a:p>
@@ -7426,15 +7925,7 @@
                   <a:srgbClr val="DDDDDD"/>
                 </a:solidFill>
               </a:rPr>
-              <a:t>Benutzung der GPIO-Pins f</a:t>
-            </a:r>
-            <a:r>
-              <a:rPr lang="en-US" smtClean="0">
-                <a:solidFill>
-                  <a:srgbClr val="DDDDDD"/>
-                </a:solidFill>
-              </a:rPr>
-              <a:t>ür PWM</a:t>
+              <a:t>Benutzung der GPIO-Pins für PWM</a:t>
             </a:r>
           </a:p>
           <a:p>
@@ -7859,7 +8350,12 @@
             <p:ph idx="1"/>
           </p:nvPr>
         </p:nvSpPr>
-        <p:spPr/>
+        <p:spPr>
+          <a:xfrm>
+            <a:off x="457200" y="1700808"/>
+            <a:ext cx="8229600" cy="4625609"/>
+          </a:xfrm>
+        </p:spPr>
         <p:txBody>
           <a:bodyPr>
             <a:normAutofit fontScale="92500"/>
@@ -7892,7 +8388,7 @@
           <a:p>
             <a:pPr lvl="1"/>
             <a:r>
-              <a:rPr lang="de-DE" dirty="0" err="1" smtClean="0">
+              <a:rPr lang="de-DE" dirty="0" err="1">
                 <a:solidFill>
                   <a:schemeClr val="accent2">
                     <a:lumMod val="20000"/>
@@ -7900,10 +8396,10 @@
                   </a:schemeClr>
                 </a:solidFill>
               </a:rPr>
-              <a:t>steerS</a:t>
-            </a:r>
-            <a:r>
-              <a:rPr lang="de-DE" dirty="0" smtClean="0">
+              <a:t>driveS</a:t>
+            </a:r>
+            <a:r>
+              <a:rPr lang="de-DE" dirty="0">
                 <a:solidFill>
                   <a:schemeClr val="accent2">
                     <a:lumMod val="20000"/>
@@ -7914,7 +8410,7 @@
               <a:t>(</a:t>
             </a:r>
             <a:r>
-              <a:rPr lang="de-DE" dirty="0" err="1" smtClean="0">
+              <a:rPr lang="de-DE" dirty="0" err="1">
                 <a:solidFill>
                   <a:schemeClr val="accent2">
                     <a:lumMod val="20000"/>
@@ -7922,10 +8418,10 @@
                   </a:schemeClr>
                 </a:solidFill>
               </a:rPr>
-              <a:t>deg</a:t>
-            </a:r>
-            <a:r>
-              <a:rPr lang="de-DE" dirty="0" smtClean="0">
+              <a:t>speed</a:t>
+            </a:r>
+            <a:r>
+              <a:rPr lang="de-DE" dirty="0">
                 <a:solidFill>
                   <a:schemeClr val="accent2">
                     <a:lumMod val="20000"/>
@@ -7939,7 +8435,7 @@
           <a:p>
             <a:pPr lvl="2"/>
             <a:r>
-              <a:rPr lang="de-DE" dirty="0" smtClean="0">
+              <a:rPr lang="de-DE" dirty="0">
                 <a:solidFill>
                   <a:schemeClr val="accent2">
                     <a:lumMod val="20000"/>
@@ -7947,10 +8443,10 @@
                   </a:schemeClr>
                 </a:solidFill>
               </a:rPr>
-              <a:t>-1 (max. rechts) &lt;= </a:t>
-            </a:r>
-            <a:r>
-              <a:rPr lang="de-DE" dirty="0" err="1" smtClean="0">
+              <a:t>-1 (Vollgas rückwärts) &lt;= </a:t>
+            </a:r>
+            <a:r>
+              <a:rPr lang="de-DE" dirty="0" err="1">
                 <a:solidFill>
                   <a:schemeClr val="accent2">
                     <a:lumMod val="20000"/>
@@ -7961,7 +8457,7 @@
               <a:t>deg</a:t>
             </a:r>
             <a:r>
-              <a:rPr lang="de-DE" dirty="0" smtClean="0">
+              <a:rPr lang="de-DE" dirty="0">
                 <a:solidFill>
                   <a:schemeClr val="accent2">
                     <a:lumMod val="20000"/>
@@ -7969,7 +8465,7 @@
                   </a:schemeClr>
                 </a:solidFill>
               </a:rPr>
-              <a:t> &lt;= 1 (max. links)</a:t>
+              <a:t> &lt;= 1 (max. Vollgas vorwärts)</a:t>
             </a:r>
           </a:p>
           <a:p>
@@ -7983,7 +8479,7 @@
                   </a:schemeClr>
                 </a:solidFill>
               </a:rPr>
-              <a:t>driveS</a:t>
+              <a:t>steerS</a:t>
             </a:r>
             <a:r>
               <a:rPr lang="de-DE" dirty="0" smtClean="0">
@@ -8005,7 +8501,7 @@
                   </a:schemeClr>
                 </a:solidFill>
               </a:rPr>
-              <a:t>speed</a:t>
+              <a:t>deg</a:t>
             </a:r>
             <a:r>
               <a:rPr lang="de-DE" dirty="0" smtClean="0">
@@ -8030,7 +8526,7 @@
                   </a:schemeClr>
                 </a:solidFill>
               </a:rPr>
-              <a:t>-1 (Vollgas rückwärts) &lt;= </a:t>
+              <a:t>-1 (max. rechts) &lt;= </a:t>
             </a:r>
             <a:r>
               <a:rPr lang="de-DE" dirty="0" err="1" smtClean="0">
@@ -8052,7 +8548,7 @@
                   </a:schemeClr>
                 </a:solidFill>
               </a:rPr>
-              <a:t> &lt;= 1 (max. Vollgas vorwärts)</a:t>
+              <a:t> &lt;= 1 (max. links)</a:t>
             </a:r>
           </a:p>
           <a:p>
@@ -8149,7 +8645,7 @@
                   </a:schemeClr>
                 </a:solidFill>
               </a:rPr>
-              <a:t>deg</a:t>
+              <a:t>radius</a:t>
             </a:r>
             <a:r>
               <a:rPr lang="de-DE" dirty="0" smtClean="0">
@@ -8487,6 +8983,70 @@
       </p:grpSpPr>
       <p:sp>
         <p:nvSpPr>
+          <p:cNvPr id="2" name="Title 1"/>
+          <p:cNvSpPr>
+            <a:spLocks noGrp="1"/>
+          </p:cNvSpPr>
+          <p:nvPr>
+            <p:ph type="title"/>
+          </p:nvPr>
+        </p:nvSpPr>
+        <p:spPr/>
+        <p:txBody>
+          <a:bodyPr/>
+          <a:lstStyle/>
+          <a:p>
+            <a:r>
+              <a:rPr lang="en-US"/>
+              <a:t>GPS-Daten</a:t>
+            </a:r>
+          </a:p>
+        </p:txBody>
+      </p:sp>
+      <p:sp>
+        <p:nvSpPr>
+          <p:cNvPr id="3" name="Content Placeholder 2"/>
+          <p:cNvSpPr>
+            <a:spLocks noGrp="1"/>
+          </p:cNvSpPr>
+          <p:nvPr>
+            <p:ph idx="1"/>
+          </p:nvPr>
+        </p:nvSpPr>
+        <p:spPr/>
+        <p:txBody>
+          <a:bodyPr/>
+          <a:lstStyle/>
+          <a:p>
+            <a:r>
+              <a:rPr lang="en-US">
+                <a:solidFill>
+                  <a:srgbClr val="DDDDDD"/>
+                </a:solidFill>
+              </a:rPr>
+              <a:t>Datenstruktur des </a:t>
+            </a:r>
+            <a:r>
+              <a:rPr lang="en-US" i="1">
+                <a:solidFill>
+                  <a:srgbClr val="DDDDDD"/>
+                </a:solidFill>
+              </a:rPr>
+              <a:t>gpsd</a:t>
+            </a:r>
+            <a:r>
+              <a:rPr lang="en-US">
+                <a:solidFill>
+                  <a:srgbClr val="DDDDDD"/>
+                </a:solidFill>
+              </a:rPr>
+              <a:t>-Datensatzes</a:t>
+            </a:r>
+          </a:p>
+        </p:txBody>
+      </p:sp>
+      <p:sp>
+        <p:nvSpPr>
           <p:cNvPr id="4" name="Slide Number Placeholder 3"/>
           <p:cNvSpPr>
             <a:spLocks noGrp="1"/>
@@ -8503,6 +9063,538 @@
             <a:fld id="{E81C4A6D-0315-4A09-8D5A-3A65F767D07B}" type="slidenum">
               <a:rPr lang="de-DE" smtClean="0"/>
               <a:t>18</a:t>
+            </a:fld>
+            <a:endParaRPr lang="de-DE"/>
+          </a:p>
+        </p:txBody>
+      </p:sp>
+    </p:spTree>
+    <p:extLst>
+      <p:ext uri="{BB962C8B-B14F-4D97-AF65-F5344CB8AC3E}">
+        <p14:creationId xmlns:p14="http://schemas.microsoft.com/office/powerpoint/2010/main" val="2765879627"/>
+      </p:ext>
+    </p:extLst>
+  </p:cSld>
+  <p:clrMapOvr>
+    <a:masterClrMapping/>
+  </p:clrMapOvr>
+</p:sld>
+</file>
+
+<file path=ppt/slides/slide19.xml><?xml version="1.0" encoding="utf-8"?>
+<p:sld xmlns:a="http://schemas.openxmlformats.org/drawingml/2006/main" xmlns:r="http://schemas.openxmlformats.org/officeDocument/2006/relationships" xmlns:p="http://schemas.openxmlformats.org/presentationml/2006/main">
+  <p:cSld>
+    <p:spTree>
+      <p:nvGrpSpPr>
+        <p:cNvPr id="1" name=""/>
+        <p:cNvGrpSpPr/>
+        <p:nvPr/>
+      </p:nvGrpSpPr>
+      <p:grpSpPr>
+        <a:xfrm>
+          <a:off x="0" y="0"/>
+          <a:ext cx="0" cy="0"/>
+          <a:chOff x="0" y="0"/>
+          <a:chExt cx="0" cy="0"/>
+        </a:xfrm>
+      </p:grpSpPr>
+      <p:sp>
+        <p:nvSpPr>
+          <p:cNvPr id="2" name="Title 1"/>
+          <p:cNvSpPr>
+            <a:spLocks noGrp="1"/>
+          </p:cNvSpPr>
+          <p:nvPr>
+            <p:ph type="title"/>
+          </p:nvPr>
+        </p:nvSpPr>
+        <p:spPr/>
+        <p:txBody>
+          <a:bodyPr/>
+          <a:lstStyle/>
+          <a:p>
+            <a:r>
+              <a:rPr lang="en-US"/>
+              <a:t>GPS-Daten</a:t>
+            </a:r>
+          </a:p>
+        </p:txBody>
+      </p:sp>
+      <p:sp>
+        <p:nvSpPr>
+          <p:cNvPr id="3" name="Content Placeholder 2"/>
+          <p:cNvSpPr>
+            <a:spLocks noGrp="1"/>
+          </p:cNvSpPr>
+          <p:nvPr>
+            <p:ph idx="1"/>
+          </p:nvPr>
+        </p:nvSpPr>
+        <p:spPr/>
+        <p:txBody>
+          <a:bodyPr/>
+          <a:lstStyle/>
+          <a:p>
+            <a:r>
+              <a:rPr lang="en-US">
+                <a:solidFill>
+                  <a:schemeClr val="accent1"/>
+                </a:solidFill>
+              </a:rPr>
+              <a:t>Kalibration des Kompass</a:t>
+            </a:r>
+          </a:p>
+        </p:txBody>
+      </p:sp>
+      <p:sp>
+        <p:nvSpPr>
+          <p:cNvPr id="4" name="Slide Number Placeholder 3"/>
+          <p:cNvSpPr>
+            <a:spLocks noGrp="1"/>
+          </p:cNvSpPr>
+          <p:nvPr>
+            <p:ph type="sldNum" sz="quarter" idx="12"/>
+          </p:nvPr>
+        </p:nvSpPr>
+        <p:spPr/>
+        <p:txBody>
+          <a:bodyPr/>
+          <a:lstStyle/>
+          <a:p>
+            <a:fld id="{E81C4A6D-0315-4A09-8D5A-3A65F767D07B}" type="slidenum">
+              <a:rPr lang="de-DE" smtClean="0"/>
+              <a:t>19</a:t>
+            </a:fld>
+            <a:endParaRPr lang="de-DE"/>
+          </a:p>
+        </p:txBody>
+      </p:sp>
+    </p:spTree>
+    <p:extLst>
+      <p:ext uri="{BB962C8B-B14F-4D97-AF65-F5344CB8AC3E}">
+        <p14:creationId xmlns:p14="http://schemas.microsoft.com/office/powerpoint/2010/main" val="2186024030"/>
+      </p:ext>
+    </p:extLst>
+  </p:cSld>
+  <p:clrMapOvr>
+    <a:masterClrMapping/>
+  </p:clrMapOvr>
+</p:sld>
+</file>
+
+<file path=ppt/slides/slide2.xml><?xml version="1.0" encoding="utf-8"?>
+<p:sld xmlns:a="http://schemas.openxmlformats.org/drawingml/2006/main" xmlns:r="http://schemas.openxmlformats.org/officeDocument/2006/relationships" xmlns:p="http://schemas.openxmlformats.org/presentationml/2006/main">
+  <p:cSld>
+    <p:spTree>
+      <p:nvGrpSpPr>
+        <p:cNvPr id="1" name=""/>
+        <p:cNvGrpSpPr/>
+        <p:nvPr/>
+      </p:nvGrpSpPr>
+      <p:grpSpPr>
+        <a:xfrm>
+          <a:off x="0" y="0"/>
+          <a:ext cx="0" cy="0"/>
+          <a:chOff x="0" y="0"/>
+          <a:chExt cx="0" cy="0"/>
+        </a:xfrm>
+      </p:grpSpPr>
+      <p:sp>
+        <p:nvSpPr>
+          <p:cNvPr id="2" name="Title 1"/>
+          <p:cNvSpPr>
+            <a:spLocks noGrp="1"/>
+          </p:cNvSpPr>
+          <p:nvPr>
+            <p:ph type="title"/>
+          </p:nvPr>
+        </p:nvSpPr>
+        <p:spPr>
+          <a:xfrm>
+            <a:off x="457200" y="88040"/>
+            <a:ext cx="8229600" cy="1252728"/>
+          </a:xfrm>
+        </p:spPr>
+        <p:txBody>
+          <a:bodyPr>
+            <a:normAutofit fontScale="90000"/>
+          </a:bodyPr>
+          <a:lstStyle/>
+          <a:p>
+            <a:r>
+              <a:rPr lang="en-US" dirty="0" smtClean="0"/>
+              <a:t>Das </a:t>
+            </a:r>
+            <a:r>
+              <a:rPr lang="en-US" dirty="0" err="1" smtClean="0"/>
+              <a:t>Robotikpraktikum</a:t>
+            </a:r>
+            <a:r>
+              <a:rPr lang="en-US" dirty="0" smtClean="0"/>
+              <a:t/>
+            </a:r>
+            <a:br>
+              <a:rPr lang="en-US" dirty="0" smtClean="0"/>
+            </a:br>
+            <a:r>
+              <a:rPr lang="en-US" dirty="0" smtClean="0"/>
+              <a:t>an der </a:t>
+            </a:r>
+            <a:r>
+              <a:rPr lang="en-US" dirty="0" err="1" smtClean="0"/>
+              <a:t>Uni</a:t>
+            </a:r>
+            <a:r>
+              <a:rPr lang="en-US" dirty="0" smtClean="0"/>
+              <a:t> Heidelberg</a:t>
+            </a:r>
+            <a:endParaRPr lang="en-US" dirty="0"/>
+          </a:p>
+        </p:txBody>
+      </p:sp>
+      <p:sp>
+        <p:nvSpPr>
+          <p:cNvPr id="3" name="Content Placeholder 2"/>
+          <p:cNvSpPr>
+            <a:spLocks noGrp="1"/>
+          </p:cNvSpPr>
+          <p:nvPr>
+            <p:ph idx="1"/>
+          </p:nvPr>
+        </p:nvSpPr>
+        <p:spPr/>
+        <p:txBody>
+          <a:bodyPr/>
+          <a:lstStyle/>
+          <a:p>
+            <a:r>
+              <a:rPr lang="en-US" dirty="0" err="1" smtClean="0">
+                <a:solidFill>
+                  <a:schemeClr val="accent1"/>
+                </a:solidFill>
+              </a:rPr>
+              <a:t>Angeboten</a:t>
+            </a:r>
+            <a:r>
+              <a:rPr lang="en-US" dirty="0" smtClean="0">
+                <a:solidFill>
+                  <a:schemeClr val="accent1"/>
+                </a:solidFill>
+              </a:rPr>
+              <a:t> von den AGs Bock und </a:t>
+            </a:r>
+            <a:r>
+              <a:rPr lang="en-US" dirty="0" err="1" smtClean="0">
+                <a:solidFill>
+                  <a:schemeClr val="accent1"/>
+                </a:solidFill>
+              </a:rPr>
+              <a:t>Mombaur</a:t>
+            </a:r>
+            <a:r>
+              <a:rPr lang="en-US" dirty="0" smtClean="0">
+                <a:solidFill>
+                  <a:schemeClr val="accent1"/>
+                </a:solidFill>
+              </a:rPr>
+              <a:t> am IWR</a:t>
+            </a:r>
+          </a:p>
+          <a:p>
+            <a:r>
+              <a:rPr lang="en-US" dirty="0" err="1" smtClean="0">
+                <a:solidFill>
+                  <a:schemeClr val="accent1"/>
+                </a:solidFill>
+              </a:rPr>
+              <a:t>Als</a:t>
+            </a:r>
+            <a:r>
+              <a:rPr lang="en-US" dirty="0" smtClean="0">
+                <a:solidFill>
+                  <a:schemeClr val="accent1"/>
+                </a:solidFill>
+              </a:rPr>
+              <a:t> </a:t>
+            </a:r>
+            <a:r>
+              <a:rPr lang="en-US" dirty="0" err="1" smtClean="0">
+                <a:solidFill>
+                  <a:schemeClr val="accent1"/>
+                </a:solidFill>
+              </a:rPr>
+              <a:t>bis</a:t>
+            </a:r>
+            <a:r>
+              <a:rPr lang="en-US" dirty="0" smtClean="0">
+                <a:solidFill>
+                  <a:schemeClr val="accent1"/>
+                </a:solidFill>
+              </a:rPr>
+              <a:t> </a:t>
+            </a:r>
+            <a:r>
+              <a:rPr lang="en-US" dirty="0" err="1" smtClean="0">
+                <a:solidFill>
+                  <a:schemeClr val="accent1"/>
+                </a:solidFill>
+              </a:rPr>
+              <a:t>zu</a:t>
+            </a:r>
+            <a:r>
+              <a:rPr lang="en-US" dirty="0" smtClean="0">
+                <a:solidFill>
+                  <a:schemeClr val="accent1"/>
+                </a:solidFill>
+              </a:rPr>
+              <a:t> </a:t>
+            </a:r>
+            <a:r>
+              <a:rPr lang="en-US" dirty="0" err="1" smtClean="0">
+                <a:solidFill>
+                  <a:schemeClr val="accent1"/>
+                </a:solidFill>
+              </a:rPr>
+              <a:t>zwei</a:t>
+            </a:r>
+            <a:r>
+              <a:rPr lang="en-US" dirty="0" smtClean="0">
+                <a:solidFill>
+                  <a:schemeClr val="accent1"/>
+                </a:solidFill>
+              </a:rPr>
+              <a:t> FP-</a:t>
+            </a:r>
+            <a:r>
+              <a:rPr lang="en-US" dirty="0" err="1" smtClean="0">
+                <a:solidFill>
+                  <a:schemeClr val="accent1"/>
+                </a:solidFill>
+              </a:rPr>
+              <a:t>Versuche</a:t>
+            </a:r>
+            <a:r>
+              <a:rPr lang="en-US" dirty="0" smtClean="0">
+                <a:solidFill>
+                  <a:schemeClr val="accent1"/>
+                </a:solidFill>
+              </a:rPr>
+              <a:t> </a:t>
+            </a:r>
+            <a:r>
+              <a:rPr lang="en-US" dirty="0" err="1" smtClean="0">
+                <a:solidFill>
+                  <a:schemeClr val="accent1"/>
+                </a:solidFill>
+              </a:rPr>
+              <a:t>anrechenbar</a:t>
+            </a:r>
+            <a:endParaRPr lang="en-US" dirty="0" smtClean="0">
+              <a:solidFill>
+                <a:schemeClr val="accent1"/>
+              </a:solidFill>
+            </a:endParaRPr>
+          </a:p>
+          <a:p>
+            <a:r>
+              <a:rPr lang="en-US" dirty="0" err="1" smtClean="0">
+                <a:solidFill>
+                  <a:schemeClr val="accent1"/>
+                </a:solidFill>
+              </a:rPr>
+              <a:t>Semesterweise</a:t>
+            </a:r>
+            <a:r>
+              <a:rPr lang="en-US" dirty="0" smtClean="0">
+                <a:solidFill>
+                  <a:schemeClr val="accent1"/>
+                </a:solidFill>
+              </a:rPr>
+              <a:t> </a:t>
+            </a:r>
+            <a:r>
+              <a:rPr lang="en-US" dirty="0" err="1" smtClean="0">
+                <a:solidFill>
+                  <a:schemeClr val="accent1"/>
+                </a:solidFill>
+              </a:rPr>
+              <a:t>Projekte</a:t>
+            </a:r>
+            <a:r>
+              <a:rPr lang="en-US" dirty="0" smtClean="0">
+                <a:solidFill>
+                  <a:schemeClr val="accent1"/>
+                </a:solidFill>
+              </a:rPr>
+              <a:t> </a:t>
+            </a:r>
+            <a:r>
+              <a:rPr lang="en-US" dirty="0" err="1" smtClean="0">
+                <a:solidFill>
+                  <a:schemeClr val="accent1"/>
+                </a:solidFill>
+              </a:rPr>
+              <a:t>aus</a:t>
+            </a:r>
+            <a:r>
+              <a:rPr lang="en-US" dirty="0" smtClean="0">
+                <a:solidFill>
+                  <a:schemeClr val="accent1"/>
+                </a:solidFill>
+              </a:rPr>
+              <a:t> der </a:t>
+            </a:r>
+            <a:r>
+              <a:rPr lang="en-US" dirty="0" err="1" smtClean="0">
+                <a:solidFill>
+                  <a:schemeClr val="accent1"/>
+                </a:solidFill>
+              </a:rPr>
+              <a:t>Robotik</a:t>
+            </a:r>
+            <a:endParaRPr lang="en-US" dirty="0">
+              <a:solidFill>
+                <a:schemeClr val="accent1"/>
+              </a:solidFill>
+            </a:endParaRPr>
+          </a:p>
+          <a:p>
+            <a:pPr lvl="1"/>
+            <a:r>
+              <a:rPr lang="en-US" dirty="0" err="1" smtClean="0">
+                <a:solidFill>
+                  <a:schemeClr val="accent1"/>
+                </a:solidFill>
+              </a:rPr>
+              <a:t>Elektronik</a:t>
+            </a:r>
+            <a:endParaRPr lang="en-US" dirty="0" smtClean="0">
+              <a:solidFill>
+                <a:schemeClr val="accent1"/>
+              </a:solidFill>
+            </a:endParaRPr>
+          </a:p>
+          <a:p>
+            <a:pPr lvl="1"/>
+            <a:r>
+              <a:rPr lang="en-US" dirty="0" err="1" smtClean="0">
+                <a:solidFill>
+                  <a:schemeClr val="accent1"/>
+                </a:solidFill>
+              </a:rPr>
+              <a:t>Roboterbau</a:t>
+            </a:r>
+            <a:endParaRPr lang="en-US" dirty="0" smtClean="0">
+              <a:solidFill>
+                <a:schemeClr val="accent1"/>
+              </a:solidFill>
+            </a:endParaRPr>
+          </a:p>
+          <a:p>
+            <a:pPr lvl="1"/>
+            <a:r>
+              <a:rPr lang="en-US" dirty="0" err="1" smtClean="0">
+                <a:solidFill>
+                  <a:schemeClr val="accent1"/>
+                </a:solidFill>
+              </a:rPr>
+              <a:t>Programmierung</a:t>
+            </a:r>
+            <a:endParaRPr lang="en-US" dirty="0">
+              <a:solidFill>
+                <a:schemeClr val="accent1"/>
+              </a:solidFill>
+            </a:endParaRPr>
+          </a:p>
+          <a:p>
+            <a:pPr lvl="1"/>
+            <a:r>
+              <a:rPr lang="en-US" dirty="0" err="1" smtClean="0">
+                <a:solidFill>
+                  <a:schemeClr val="accent1"/>
+                </a:solidFill>
+              </a:rPr>
+              <a:t>Sensorik</a:t>
+            </a:r>
+            <a:endParaRPr lang="en-US" dirty="0">
+              <a:solidFill>
+                <a:schemeClr val="accent1"/>
+              </a:solidFill>
+            </a:endParaRPr>
+          </a:p>
+        </p:txBody>
+      </p:sp>
+      <p:sp>
+        <p:nvSpPr>
+          <p:cNvPr id="4" name="Slide Number Placeholder 3"/>
+          <p:cNvSpPr>
+            <a:spLocks noGrp="1"/>
+          </p:cNvSpPr>
+          <p:nvPr>
+            <p:ph type="sldNum" sz="quarter" idx="12"/>
+          </p:nvPr>
+        </p:nvSpPr>
+        <p:spPr/>
+        <p:txBody>
+          <a:bodyPr/>
+          <a:lstStyle/>
+          <a:p>
+            <a:fld id="{E81C4A6D-0315-4A09-8D5A-3A65F767D07B}" type="slidenum">
+              <a:rPr lang="de-DE" smtClean="0"/>
+              <a:t>2</a:t>
+            </a:fld>
+            <a:endParaRPr lang="de-DE"/>
+          </a:p>
+        </p:txBody>
+      </p:sp>
+    </p:spTree>
+    <p:extLst>
+      <p:ext uri="{BB962C8B-B14F-4D97-AF65-F5344CB8AC3E}">
+        <p14:creationId xmlns:p14="http://schemas.microsoft.com/office/powerpoint/2010/main" val="2886254144"/>
+      </p:ext>
+    </p:extLst>
+  </p:cSld>
+  <p:clrMapOvr>
+    <a:masterClrMapping/>
+  </p:clrMapOvr>
+</p:sld>
+</file>
+
+<file path=ppt/slides/slide20.xml><?xml version="1.0" encoding="utf-8"?>
+<p:sld xmlns:a="http://schemas.openxmlformats.org/drawingml/2006/main" xmlns:r="http://schemas.openxmlformats.org/officeDocument/2006/relationships" xmlns:p="http://schemas.openxmlformats.org/presentationml/2006/main">
+  <p:cSld>
+    <p:spTree>
+      <p:nvGrpSpPr>
+        <p:cNvPr id="1" name=""/>
+        <p:cNvGrpSpPr/>
+        <p:nvPr/>
+      </p:nvGrpSpPr>
+      <p:grpSpPr>
+        <a:xfrm>
+          <a:off x="0" y="0"/>
+          <a:ext cx="0" cy="0"/>
+          <a:chOff x="0" y="0"/>
+          <a:chExt cx="0" cy="0"/>
+        </a:xfrm>
+      </p:grpSpPr>
+      <p:sp>
+        <p:nvSpPr>
+          <p:cNvPr id="4" name="Slide Number Placeholder 3"/>
+          <p:cNvSpPr>
+            <a:spLocks noGrp="1"/>
+          </p:cNvSpPr>
+          <p:nvPr>
+            <p:ph type="sldNum" sz="quarter" idx="12"/>
+          </p:nvPr>
+        </p:nvSpPr>
+        <p:spPr/>
+        <p:txBody>
+          <a:bodyPr/>
+          <a:lstStyle/>
+          <a:p>
+            <a:fld id="{E81C4A6D-0315-4A09-8D5A-3A65F767D07B}" type="slidenum">
+              <a:rPr lang="de-DE" smtClean="0"/>
+              <a:t>20</a:t>
             </a:fld>
             <a:endParaRPr lang="de-DE"/>
           </a:p>
@@ -8574,7 +9666,108 @@
 </p:sld>
 </file>
 
-<file path=ppt/slides/slide19.xml><?xml version="1.0" encoding="utf-8"?>
+<file path=ppt/slides/slide21.xml><?xml version="1.0" encoding="utf-8"?>
+<p:sld xmlns:a="http://schemas.openxmlformats.org/drawingml/2006/main" xmlns:r="http://schemas.openxmlformats.org/officeDocument/2006/relationships" xmlns:p="http://schemas.openxmlformats.org/presentationml/2006/main">
+  <p:cSld>
+    <p:spTree>
+      <p:nvGrpSpPr>
+        <p:cNvPr id="1" name=""/>
+        <p:cNvGrpSpPr/>
+        <p:nvPr/>
+      </p:nvGrpSpPr>
+      <p:grpSpPr>
+        <a:xfrm>
+          <a:off x="0" y="0"/>
+          <a:ext cx="0" cy="0"/>
+          <a:chOff x="0" y="0"/>
+          <a:chExt cx="0" cy="0"/>
+        </a:xfrm>
+      </p:grpSpPr>
+      <p:sp>
+        <p:nvSpPr>
+          <p:cNvPr id="2" name="Title 1"/>
+          <p:cNvSpPr>
+            <a:spLocks noGrp="1"/>
+          </p:cNvSpPr>
+          <p:nvPr>
+            <p:ph type="title"/>
+          </p:nvPr>
+        </p:nvSpPr>
+        <p:spPr/>
+        <p:txBody>
+          <a:bodyPr/>
+          <a:lstStyle/>
+          <a:p>
+            <a:r>
+              <a:rPr lang="en-US"/>
+              <a:t>Navigation</a:t>
+            </a:r>
+          </a:p>
+        </p:txBody>
+      </p:sp>
+      <p:sp>
+        <p:nvSpPr>
+          <p:cNvPr id="3" name="Content Placeholder 2"/>
+          <p:cNvSpPr>
+            <a:spLocks noGrp="1"/>
+          </p:cNvSpPr>
+          <p:nvPr>
+            <p:ph idx="1"/>
+          </p:nvPr>
+        </p:nvSpPr>
+        <p:spPr/>
+        <p:txBody>
+          <a:bodyPr/>
+          <a:lstStyle/>
+          <a:p>
+            <a:r>
+              <a:rPr lang="en-US">
+                <a:solidFill>
+                  <a:srgbClr val="DDDDDD"/>
+                </a:solidFill>
+              </a:rPr>
+              <a:t>Mathematik/Code dahinter</a:t>
+            </a:r>
+          </a:p>
+        </p:txBody>
+      </p:sp>
+      <p:sp>
+        <p:nvSpPr>
+          <p:cNvPr id="4" name="Slide Number Placeholder 3"/>
+          <p:cNvSpPr>
+            <a:spLocks noGrp="1"/>
+          </p:cNvSpPr>
+          <p:nvPr>
+            <p:ph type="sldNum" sz="quarter" idx="12"/>
+          </p:nvPr>
+        </p:nvSpPr>
+        <p:spPr/>
+        <p:txBody>
+          <a:bodyPr/>
+          <a:lstStyle/>
+          <a:p>
+            <a:fld id="{E81C4A6D-0315-4A09-8D5A-3A65F767D07B}" type="slidenum">
+              <a:rPr lang="de-DE" smtClean="0"/>
+              <a:t>21</a:t>
+            </a:fld>
+            <a:endParaRPr lang="de-DE"/>
+          </a:p>
+        </p:txBody>
+      </p:sp>
+    </p:spTree>
+    <p:extLst>
+      <p:ext uri="{BB962C8B-B14F-4D97-AF65-F5344CB8AC3E}">
+        <p14:creationId xmlns:p14="http://schemas.microsoft.com/office/powerpoint/2010/main" val="1916418535"/>
+      </p:ext>
+    </p:extLst>
+  </p:cSld>
+  <p:clrMapOvr>
+    <a:masterClrMapping/>
+  </p:clrMapOvr>
+</p:sld>
+</file>
+
+<file path=ppt/slides/slide22.xml><?xml version="1.0" encoding="utf-8"?>
 <p:sld xmlns:a="http://schemas.openxmlformats.org/drawingml/2006/main" xmlns:r="http://schemas.openxmlformats.org/officeDocument/2006/relationships" xmlns:p="http://schemas.openxmlformats.org/presentationml/2006/main">
   <p:cSld>
     <p:spTree>
@@ -8644,952 +9837,6 @@
           </a:xfrm>
         </p:spPr>
       </p:pic>
-      <p:sp>
-        <p:nvSpPr>
-          <p:cNvPr id="4" name="Foliennummernplatzhalter 3"/>
-          <p:cNvSpPr>
-            <a:spLocks noGrp="1"/>
-          </p:cNvSpPr>
-          <p:nvPr>
-            <p:ph type="sldNum" sz="quarter" idx="12"/>
-          </p:nvPr>
-        </p:nvSpPr>
-        <p:spPr/>
-        <p:txBody>
-          <a:bodyPr/>
-          <a:lstStyle/>
-          <a:p>
-            <a:fld id="{E81C4A6D-0315-4A09-8D5A-3A65F767D07B}" type="slidenum">
-              <a:rPr lang="de-DE" smtClean="0"/>
-              <a:t>19</a:t>
-            </a:fld>
-            <a:endParaRPr lang="de-DE"/>
-          </a:p>
-        </p:txBody>
-      </p:sp>
-    </p:spTree>
-  </p:cSld>
-  <p:clrMapOvr>
-    <a:masterClrMapping/>
-  </p:clrMapOvr>
-  <p:timing>
-    <p:tnLst>
-      <p:par>
-        <p:cTn xmlns:p14="http://schemas.microsoft.com/office/powerpoint/2010/main" id="1" dur="indefinite" restart="never" nodeType="tmRoot"/>
-      </p:par>
-    </p:tnLst>
-  </p:timing>
-</p:sld>
-</file>
-
-<file path=ppt/slides/slide2.xml><?xml version="1.0" encoding="utf-8"?>
-<p:sld xmlns:a="http://schemas.openxmlformats.org/drawingml/2006/main" xmlns:r="http://schemas.openxmlformats.org/officeDocument/2006/relationships" xmlns:p="http://schemas.openxmlformats.org/presentationml/2006/main">
-  <p:cSld>
-    <p:spTree>
-      <p:nvGrpSpPr>
-        <p:cNvPr id="1" name=""/>
-        <p:cNvGrpSpPr/>
-        <p:nvPr/>
-      </p:nvGrpSpPr>
-      <p:grpSpPr>
-        <a:xfrm>
-          <a:off x="0" y="0"/>
-          <a:ext cx="0" cy="0"/>
-          <a:chOff x="0" y="0"/>
-          <a:chExt cx="0" cy="0"/>
-        </a:xfrm>
-      </p:grpSpPr>
-      <p:sp>
-        <p:nvSpPr>
-          <p:cNvPr id="2" name="Title 1"/>
-          <p:cNvSpPr>
-            <a:spLocks noGrp="1"/>
-          </p:cNvSpPr>
-          <p:nvPr>
-            <p:ph type="title"/>
-          </p:nvPr>
-        </p:nvSpPr>
-        <p:spPr>
-          <a:xfrm>
-            <a:off x="457200" y="88040"/>
-            <a:ext cx="8229600" cy="1252728"/>
-          </a:xfrm>
-        </p:spPr>
-        <p:txBody>
-          <a:bodyPr>
-            <a:normAutofit fontScale="90000"/>
-          </a:bodyPr>
-          <a:lstStyle/>
-          <a:p>
-            <a:r>
-              <a:rPr lang="en-US" dirty="0" smtClean="0"/>
-              <a:t>Das </a:t>
-            </a:r>
-            <a:r>
-              <a:rPr lang="en-US" dirty="0" err="1" smtClean="0"/>
-              <a:t>Robotikpraktikum</a:t>
-            </a:r>
-            <a:r>
-              <a:rPr lang="en-US" dirty="0" smtClean="0"/>
-              <a:t/>
-            </a:r>
-            <a:br>
-              <a:rPr lang="en-US" dirty="0" smtClean="0"/>
-            </a:br>
-            <a:r>
-              <a:rPr lang="en-US" dirty="0" smtClean="0"/>
-              <a:t>an der </a:t>
-            </a:r>
-            <a:r>
-              <a:rPr lang="en-US" dirty="0" err="1" smtClean="0"/>
-              <a:t>Uni</a:t>
-            </a:r>
-            <a:r>
-              <a:rPr lang="en-US" dirty="0" smtClean="0"/>
-              <a:t> Heidelberg</a:t>
-            </a:r>
-            <a:endParaRPr lang="en-US" dirty="0"/>
-          </a:p>
-        </p:txBody>
-      </p:sp>
-      <p:sp>
-        <p:nvSpPr>
-          <p:cNvPr id="3" name="Content Placeholder 2"/>
-          <p:cNvSpPr>
-            <a:spLocks noGrp="1"/>
-          </p:cNvSpPr>
-          <p:nvPr>
-            <p:ph idx="1"/>
-          </p:nvPr>
-        </p:nvSpPr>
-        <p:spPr/>
-        <p:txBody>
-          <a:bodyPr/>
-          <a:lstStyle/>
-          <a:p>
-            <a:r>
-              <a:rPr lang="en-US" dirty="0" err="1" smtClean="0">
-                <a:solidFill>
-                  <a:schemeClr val="accent1"/>
-                </a:solidFill>
-              </a:rPr>
-              <a:t>Angeboten</a:t>
-            </a:r>
-            <a:r>
-              <a:rPr lang="en-US" dirty="0" smtClean="0">
-                <a:solidFill>
-                  <a:schemeClr val="accent1"/>
-                </a:solidFill>
-              </a:rPr>
-              <a:t> von den AGs Bock und </a:t>
-            </a:r>
-            <a:r>
-              <a:rPr lang="en-US" dirty="0" err="1" smtClean="0">
-                <a:solidFill>
-                  <a:schemeClr val="accent1"/>
-                </a:solidFill>
-              </a:rPr>
-              <a:t>Mombaur</a:t>
-            </a:r>
-            <a:r>
-              <a:rPr lang="en-US" dirty="0" smtClean="0">
-                <a:solidFill>
-                  <a:schemeClr val="accent1"/>
-                </a:solidFill>
-              </a:rPr>
-              <a:t> am IWR</a:t>
-            </a:r>
-          </a:p>
-          <a:p>
-            <a:r>
-              <a:rPr lang="en-US" dirty="0" err="1" smtClean="0">
-                <a:solidFill>
-                  <a:schemeClr val="accent1"/>
-                </a:solidFill>
-              </a:rPr>
-              <a:t>Als</a:t>
-            </a:r>
-            <a:r>
-              <a:rPr lang="en-US" dirty="0" smtClean="0">
-                <a:solidFill>
-                  <a:schemeClr val="accent1"/>
-                </a:solidFill>
-              </a:rPr>
-              <a:t> </a:t>
-            </a:r>
-            <a:r>
-              <a:rPr lang="en-US" dirty="0" err="1" smtClean="0">
-                <a:solidFill>
-                  <a:schemeClr val="accent1"/>
-                </a:solidFill>
-              </a:rPr>
-              <a:t>bis</a:t>
-            </a:r>
-            <a:r>
-              <a:rPr lang="en-US" dirty="0" smtClean="0">
-                <a:solidFill>
-                  <a:schemeClr val="accent1"/>
-                </a:solidFill>
-              </a:rPr>
-              <a:t> </a:t>
-            </a:r>
-            <a:r>
-              <a:rPr lang="en-US" dirty="0" err="1" smtClean="0">
-                <a:solidFill>
-                  <a:schemeClr val="accent1"/>
-                </a:solidFill>
-              </a:rPr>
-              <a:t>zu</a:t>
-            </a:r>
-            <a:r>
-              <a:rPr lang="en-US" dirty="0" smtClean="0">
-                <a:solidFill>
-                  <a:schemeClr val="accent1"/>
-                </a:solidFill>
-              </a:rPr>
-              <a:t> </a:t>
-            </a:r>
-            <a:r>
-              <a:rPr lang="en-US" dirty="0" err="1" smtClean="0">
-                <a:solidFill>
-                  <a:schemeClr val="accent1"/>
-                </a:solidFill>
-              </a:rPr>
-              <a:t>zwei</a:t>
-            </a:r>
-            <a:r>
-              <a:rPr lang="en-US" dirty="0" smtClean="0">
-                <a:solidFill>
-                  <a:schemeClr val="accent1"/>
-                </a:solidFill>
-              </a:rPr>
-              <a:t> FP-</a:t>
-            </a:r>
-            <a:r>
-              <a:rPr lang="en-US" dirty="0" err="1" smtClean="0">
-                <a:solidFill>
-                  <a:schemeClr val="accent1"/>
-                </a:solidFill>
-              </a:rPr>
-              <a:t>Versuche</a:t>
-            </a:r>
-            <a:r>
-              <a:rPr lang="en-US" dirty="0" smtClean="0">
-                <a:solidFill>
-                  <a:schemeClr val="accent1"/>
-                </a:solidFill>
-              </a:rPr>
-              <a:t> </a:t>
-            </a:r>
-            <a:r>
-              <a:rPr lang="en-US" dirty="0" err="1" smtClean="0">
-                <a:solidFill>
-                  <a:schemeClr val="accent1"/>
-                </a:solidFill>
-              </a:rPr>
-              <a:t>anrechenbar</a:t>
-            </a:r>
-            <a:endParaRPr lang="en-US" dirty="0" smtClean="0">
-              <a:solidFill>
-                <a:schemeClr val="accent1"/>
-              </a:solidFill>
-            </a:endParaRPr>
-          </a:p>
-          <a:p>
-            <a:r>
-              <a:rPr lang="en-US" dirty="0" err="1" smtClean="0">
-                <a:solidFill>
-                  <a:schemeClr val="accent1"/>
-                </a:solidFill>
-              </a:rPr>
-              <a:t>Semesterweise</a:t>
-            </a:r>
-            <a:r>
-              <a:rPr lang="en-US" dirty="0" smtClean="0">
-                <a:solidFill>
-                  <a:schemeClr val="accent1"/>
-                </a:solidFill>
-              </a:rPr>
-              <a:t> </a:t>
-            </a:r>
-            <a:r>
-              <a:rPr lang="en-US" dirty="0" err="1" smtClean="0">
-                <a:solidFill>
-                  <a:schemeClr val="accent1"/>
-                </a:solidFill>
-              </a:rPr>
-              <a:t>Projekte</a:t>
-            </a:r>
-            <a:r>
-              <a:rPr lang="en-US" dirty="0" smtClean="0">
-                <a:solidFill>
-                  <a:schemeClr val="accent1"/>
-                </a:solidFill>
-              </a:rPr>
-              <a:t> </a:t>
-            </a:r>
-            <a:r>
-              <a:rPr lang="en-US" dirty="0" err="1" smtClean="0">
-                <a:solidFill>
-                  <a:schemeClr val="accent1"/>
-                </a:solidFill>
-              </a:rPr>
-              <a:t>aus</a:t>
-            </a:r>
-            <a:r>
-              <a:rPr lang="en-US" dirty="0" smtClean="0">
-                <a:solidFill>
-                  <a:schemeClr val="accent1"/>
-                </a:solidFill>
-              </a:rPr>
-              <a:t> der </a:t>
-            </a:r>
-            <a:r>
-              <a:rPr lang="en-US" dirty="0" err="1" smtClean="0">
-                <a:solidFill>
-                  <a:schemeClr val="accent1"/>
-                </a:solidFill>
-              </a:rPr>
-              <a:t>Robotik</a:t>
-            </a:r>
-            <a:endParaRPr lang="en-US" dirty="0">
-              <a:solidFill>
-                <a:schemeClr val="accent1"/>
-              </a:solidFill>
-            </a:endParaRPr>
-          </a:p>
-          <a:p>
-            <a:pPr lvl="1"/>
-            <a:r>
-              <a:rPr lang="en-US" dirty="0" err="1" smtClean="0">
-                <a:solidFill>
-                  <a:schemeClr val="accent1"/>
-                </a:solidFill>
-              </a:rPr>
-              <a:t>Elektronik</a:t>
-            </a:r>
-            <a:endParaRPr lang="en-US" dirty="0" smtClean="0">
-              <a:solidFill>
-                <a:schemeClr val="accent1"/>
-              </a:solidFill>
-            </a:endParaRPr>
-          </a:p>
-          <a:p>
-            <a:pPr lvl="1"/>
-            <a:r>
-              <a:rPr lang="en-US" dirty="0" err="1" smtClean="0">
-                <a:solidFill>
-                  <a:schemeClr val="accent1"/>
-                </a:solidFill>
-              </a:rPr>
-              <a:t>Roboterbau</a:t>
-            </a:r>
-            <a:endParaRPr lang="en-US" dirty="0" smtClean="0">
-              <a:solidFill>
-                <a:schemeClr val="accent1"/>
-              </a:solidFill>
-            </a:endParaRPr>
-          </a:p>
-          <a:p>
-            <a:pPr lvl="1"/>
-            <a:r>
-              <a:rPr lang="en-US" dirty="0" err="1" smtClean="0">
-                <a:solidFill>
-                  <a:schemeClr val="accent1"/>
-                </a:solidFill>
-              </a:rPr>
-              <a:t>Programmierung</a:t>
-            </a:r>
-            <a:endParaRPr lang="en-US" dirty="0">
-              <a:solidFill>
-                <a:schemeClr val="accent1"/>
-              </a:solidFill>
-            </a:endParaRPr>
-          </a:p>
-          <a:p>
-            <a:pPr lvl="1"/>
-            <a:r>
-              <a:rPr lang="en-US" dirty="0" err="1" smtClean="0">
-                <a:solidFill>
-                  <a:schemeClr val="accent1"/>
-                </a:solidFill>
-              </a:rPr>
-              <a:t>Sensorik</a:t>
-            </a:r>
-            <a:endParaRPr lang="en-US" dirty="0">
-              <a:solidFill>
-                <a:schemeClr val="accent1"/>
-              </a:solidFill>
-            </a:endParaRPr>
-          </a:p>
-        </p:txBody>
-      </p:sp>
-      <p:sp>
-        <p:nvSpPr>
-          <p:cNvPr id="4" name="Slide Number Placeholder 3"/>
-          <p:cNvSpPr>
-            <a:spLocks noGrp="1"/>
-          </p:cNvSpPr>
-          <p:nvPr>
-            <p:ph type="sldNum" sz="quarter" idx="12"/>
-          </p:nvPr>
-        </p:nvSpPr>
-        <p:spPr/>
-        <p:txBody>
-          <a:bodyPr/>
-          <a:lstStyle/>
-          <a:p>
-            <a:fld id="{E81C4A6D-0315-4A09-8D5A-3A65F767D07B}" type="slidenum">
-              <a:rPr lang="de-DE" smtClean="0"/>
-              <a:t>2</a:t>
-            </a:fld>
-            <a:endParaRPr lang="de-DE"/>
-          </a:p>
-        </p:txBody>
-      </p:sp>
-    </p:spTree>
-    <p:extLst>
-      <p:ext uri="{BB962C8B-B14F-4D97-AF65-F5344CB8AC3E}">
-        <p14:creationId xmlns:p14="http://schemas.microsoft.com/office/powerpoint/2010/main" val="2886254144"/>
-      </p:ext>
-    </p:extLst>
-  </p:cSld>
-  <p:clrMapOvr>
-    <a:masterClrMapping/>
-  </p:clrMapOvr>
-</p:sld>
-</file>
-
-<file path=ppt/slides/slide20.xml><?xml version="1.0" encoding="utf-8"?>
-<p:sld xmlns:a="http://schemas.openxmlformats.org/drawingml/2006/main" xmlns:r="http://schemas.openxmlformats.org/officeDocument/2006/relationships" xmlns:p="http://schemas.openxmlformats.org/presentationml/2006/main">
-  <p:cSld>
-    <p:spTree>
-      <p:nvGrpSpPr>
-        <p:cNvPr id="1" name=""/>
-        <p:cNvGrpSpPr/>
-        <p:nvPr/>
-      </p:nvGrpSpPr>
-      <p:grpSpPr>
-        <a:xfrm>
-          <a:off x="0" y="0"/>
-          <a:ext cx="0" cy="0"/>
-          <a:chOff x="0" y="0"/>
-          <a:chExt cx="0" cy="0"/>
-        </a:xfrm>
-      </p:grpSpPr>
-      <p:sp>
-        <p:nvSpPr>
-          <p:cNvPr id="2" name="Title 1"/>
-          <p:cNvSpPr>
-            <a:spLocks noGrp="1"/>
-          </p:cNvSpPr>
-          <p:nvPr>
-            <p:ph type="title"/>
-          </p:nvPr>
-        </p:nvSpPr>
-        <p:spPr/>
-        <p:txBody>
-          <a:bodyPr/>
-          <a:lstStyle/>
-          <a:p>
-            <a:r>
-              <a:rPr lang="en-US" dirty="0" err="1" smtClean="0"/>
-              <a:t>Hinderniserkennung</a:t>
-            </a:r>
-            <a:endParaRPr lang="en-US" dirty="0"/>
-          </a:p>
-        </p:txBody>
-      </p:sp>
-      <p:sp>
-        <p:nvSpPr>
-          <p:cNvPr id="3" name="Content Placeholder 2"/>
-          <p:cNvSpPr>
-            <a:spLocks noGrp="1"/>
-          </p:cNvSpPr>
-          <p:nvPr>
-            <p:ph idx="1"/>
-          </p:nvPr>
-        </p:nvSpPr>
-        <p:spPr>
-          <a:xfrm>
-            <a:off x="457200" y="2852937"/>
-            <a:ext cx="8229600" cy="2470118"/>
-          </a:xfrm>
-        </p:spPr>
-        <p:txBody>
-          <a:bodyPr/>
-          <a:lstStyle/>
-          <a:p>
-            <a:r>
-              <a:rPr lang="en-US" dirty="0" err="1" smtClean="0">
-                <a:solidFill>
-                  <a:srgbClr val="F0F0F0"/>
-                </a:solidFill>
-              </a:rPr>
-              <a:t>Herausforderungen</a:t>
-            </a:r>
-            <a:r>
-              <a:rPr lang="en-US" dirty="0" smtClean="0">
-                <a:solidFill>
-                  <a:srgbClr val="F0F0F0"/>
-                </a:solidFill>
-              </a:rPr>
-              <a:t>:</a:t>
-            </a:r>
-          </a:p>
-          <a:p>
-            <a:pPr lvl="1"/>
-            <a:r>
-              <a:rPr lang="en-US" dirty="0" err="1" smtClean="0">
-                <a:solidFill>
-                  <a:srgbClr val="F0F0F0"/>
-                </a:solidFill>
-              </a:rPr>
-              <a:t>Reflexionen</a:t>
-            </a:r>
-            <a:r>
-              <a:rPr lang="en-US" dirty="0" smtClean="0">
-                <a:solidFill>
-                  <a:srgbClr val="F0F0F0"/>
-                </a:solidFill>
-              </a:rPr>
-              <a:t> am </a:t>
-            </a:r>
-            <a:r>
-              <a:rPr lang="en-US" dirty="0" err="1" smtClean="0">
-                <a:solidFill>
-                  <a:srgbClr val="F0F0F0"/>
-                </a:solidFill>
-              </a:rPr>
-              <a:t>Boden</a:t>
-            </a:r>
-            <a:endParaRPr lang="en-US" dirty="0">
-              <a:solidFill>
-                <a:srgbClr val="F0F0F0"/>
-              </a:solidFill>
-            </a:endParaRPr>
-          </a:p>
-          <a:p>
-            <a:pPr lvl="1"/>
-            <a:r>
-              <a:rPr lang="en-US" dirty="0" err="1" smtClean="0">
-                <a:solidFill>
-                  <a:srgbClr val="F0F0F0"/>
-                </a:solidFill>
-              </a:rPr>
-              <a:t>Frontale</a:t>
-            </a:r>
-            <a:r>
-              <a:rPr lang="en-US" dirty="0" smtClean="0">
-                <a:solidFill>
-                  <a:srgbClr val="F0F0F0"/>
-                </a:solidFill>
-              </a:rPr>
-              <a:t> </a:t>
-            </a:r>
-            <a:r>
-              <a:rPr lang="en-US" dirty="0" err="1" smtClean="0">
-                <a:solidFill>
-                  <a:srgbClr val="F0F0F0"/>
-                </a:solidFill>
-              </a:rPr>
-              <a:t>Objekte</a:t>
-            </a:r>
-            <a:endParaRPr lang="en-US" dirty="0">
-              <a:solidFill>
-                <a:srgbClr val="F0F0F0"/>
-              </a:solidFill>
-            </a:endParaRPr>
-          </a:p>
-          <a:p>
-            <a:pPr lvl="1"/>
-            <a:r>
-              <a:rPr lang="en-US" dirty="0" err="1" smtClean="0">
-                <a:solidFill>
-                  <a:srgbClr val="F0F0F0"/>
-                </a:solidFill>
-              </a:rPr>
-              <a:t>Spontane</a:t>
-            </a:r>
-            <a:r>
-              <a:rPr lang="en-US" dirty="0" smtClean="0">
-                <a:solidFill>
-                  <a:srgbClr val="F0F0F0"/>
-                </a:solidFill>
-              </a:rPr>
-              <a:t> </a:t>
-            </a:r>
-            <a:r>
-              <a:rPr lang="en-US" dirty="0" err="1" smtClean="0">
-                <a:solidFill>
-                  <a:srgbClr val="F0F0F0"/>
-                </a:solidFill>
-              </a:rPr>
-              <a:t>Ausreißer</a:t>
-            </a:r>
-            <a:endParaRPr lang="en-US" dirty="0" smtClean="0">
-              <a:solidFill>
-                <a:srgbClr val="F0F0F0"/>
-              </a:solidFill>
-            </a:endParaRPr>
-          </a:p>
-          <a:p>
-            <a:pPr lvl="1"/>
-            <a:endParaRPr lang="en-US" dirty="0">
-              <a:solidFill>
-                <a:srgbClr val="F0F0F0"/>
-              </a:solidFill>
-            </a:endParaRPr>
-          </a:p>
-        </p:txBody>
-      </p:sp>
-      <p:sp>
-        <p:nvSpPr>
-          <p:cNvPr id="4" name="Slide Number Placeholder 3"/>
-          <p:cNvSpPr>
-            <a:spLocks noGrp="1"/>
-          </p:cNvSpPr>
-          <p:nvPr>
-            <p:ph type="sldNum" sz="quarter" idx="12"/>
-          </p:nvPr>
-        </p:nvSpPr>
-        <p:spPr/>
-        <p:txBody>
-          <a:bodyPr/>
-          <a:lstStyle/>
-          <a:p>
-            <a:fld id="{E81C4A6D-0315-4A09-8D5A-3A65F767D07B}" type="slidenum">
-              <a:rPr lang="de-DE" smtClean="0"/>
-              <a:t>20</a:t>
-            </a:fld>
-            <a:endParaRPr lang="de-DE"/>
-          </a:p>
-        </p:txBody>
-      </p:sp>
-    </p:spTree>
-    <p:extLst>
-      <p:ext uri="{BB962C8B-B14F-4D97-AF65-F5344CB8AC3E}">
-        <p14:creationId xmlns:p14="http://schemas.microsoft.com/office/powerpoint/2010/main" val="27762390"/>
-      </p:ext>
-    </p:extLst>
-  </p:cSld>
-  <p:clrMapOvr>
-    <a:masterClrMapping/>
-  </p:clrMapOvr>
-</p:sld>
-</file>
-
-<file path=ppt/slides/slide21.xml><?xml version="1.0" encoding="utf-8"?>
-<p:sld xmlns:a="http://schemas.openxmlformats.org/drawingml/2006/main" xmlns:r="http://schemas.openxmlformats.org/officeDocument/2006/relationships" xmlns:p="http://schemas.openxmlformats.org/presentationml/2006/main">
-  <p:cSld>
-    <p:spTree>
-      <p:nvGrpSpPr>
-        <p:cNvPr id="1" name=""/>
-        <p:cNvGrpSpPr/>
-        <p:nvPr/>
-      </p:nvGrpSpPr>
-      <p:grpSpPr>
-        <a:xfrm>
-          <a:off x="0" y="0"/>
-          <a:ext cx="0" cy="0"/>
-          <a:chOff x="0" y="0"/>
-          <a:chExt cx="0" cy="0"/>
-        </a:xfrm>
-      </p:grpSpPr>
-      <p:sp>
-        <p:nvSpPr>
-          <p:cNvPr id="2" name="Titel 1"/>
-          <p:cNvSpPr>
-            <a:spLocks noGrp="1"/>
-          </p:cNvSpPr>
-          <p:nvPr>
-            <p:ph type="title"/>
-          </p:nvPr>
-        </p:nvSpPr>
-        <p:spPr/>
-        <p:txBody>
-          <a:bodyPr/>
-          <a:lstStyle/>
-          <a:p>
-            <a:r>
-              <a:rPr lang="de-DE" dirty="0" smtClean="0"/>
-              <a:t>Zusammenspiel</a:t>
-            </a:r>
-            <a:endParaRPr lang="de-DE" dirty="0"/>
-          </a:p>
-        </p:txBody>
-      </p:sp>
-      <p:sp>
-        <p:nvSpPr>
-          <p:cNvPr id="5" name="Inhaltsplatzhalter 4"/>
-          <p:cNvSpPr>
-            <a:spLocks noGrp="1"/>
-          </p:cNvSpPr>
-          <p:nvPr>
-            <p:ph idx="1"/>
-          </p:nvPr>
-        </p:nvSpPr>
-        <p:spPr/>
-        <p:txBody>
-          <a:bodyPr/>
-          <a:lstStyle/>
-          <a:p>
-            <a:endParaRPr lang="de-DE"/>
-          </a:p>
-        </p:txBody>
-      </p:sp>
-      <p:pic>
-        <p:nvPicPr>
-          <p:cNvPr id="2050" name="Picture 2" descr="I:\AAAUni\3.Semester\A Robotik-Praktikum\Bilder Doku\main.py2.jpg"/>
-          <p:cNvPicPr>
-            <a:picLocks noChangeAspect="1" noChangeArrowheads="1"/>
-          </p:cNvPicPr>
-          <p:nvPr/>
-        </p:nvPicPr>
-        <p:blipFill>
-          <a:blip r:embed="rId2"/>
-          <a:srcRect/>
-          <a:stretch>
-            <a:fillRect/>
-          </a:stretch>
-        </p:blipFill>
-        <p:spPr bwMode="auto">
-          <a:xfrm>
-            <a:off x="0" y="2000240"/>
-            <a:ext cx="9144702" cy="4132271"/>
-          </a:xfrm>
-          <a:prstGeom prst="rect">
-            <a:avLst/>
-          </a:prstGeom>
-          <a:noFill/>
-        </p:spPr>
-      </p:pic>
-      <p:sp>
-        <p:nvSpPr>
-          <p:cNvPr id="7" name="Foliennummernplatzhalter 6"/>
-          <p:cNvSpPr>
-            <a:spLocks noGrp="1"/>
-          </p:cNvSpPr>
-          <p:nvPr>
-            <p:ph type="sldNum" sz="quarter" idx="12"/>
-          </p:nvPr>
-        </p:nvSpPr>
-        <p:spPr/>
-        <p:txBody>
-          <a:bodyPr/>
-          <a:lstStyle/>
-          <a:p>
-            <a:fld id="{E81C4A6D-0315-4A09-8D5A-3A65F767D07B}" type="slidenum">
-              <a:rPr lang="de-DE" smtClean="0"/>
-              <a:t>21</a:t>
-            </a:fld>
-            <a:endParaRPr lang="de-DE"/>
-          </a:p>
-        </p:txBody>
-      </p:sp>
-    </p:spTree>
-  </p:cSld>
-  <p:clrMapOvr>
-    <a:masterClrMapping/>
-  </p:clrMapOvr>
-  <p:timing>
-    <p:tnLst>
-      <p:par>
-        <p:cTn xmlns:p14="http://schemas.microsoft.com/office/powerpoint/2010/main" id="1" dur="indefinite" restart="never" nodeType="tmRoot"/>
-      </p:par>
-    </p:tnLst>
-  </p:timing>
-</p:sld>
-</file>
-
-<file path=ppt/slides/slide22.xml><?xml version="1.0" encoding="utf-8"?>
-<p:sld xmlns:a="http://schemas.openxmlformats.org/drawingml/2006/main" xmlns:r="http://schemas.openxmlformats.org/officeDocument/2006/relationships" xmlns:p="http://schemas.openxmlformats.org/presentationml/2006/main">
-  <p:cSld>
-    <p:spTree>
-      <p:nvGrpSpPr>
-        <p:cNvPr id="1" name=""/>
-        <p:cNvGrpSpPr/>
-        <p:nvPr/>
-      </p:nvGrpSpPr>
-      <p:grpSpPr>
-        <a:xfrm>
-          <a:off x="0" y="0"/>
-          <a:ext cx="0" cy="0"/>
-          <a:chOff x="0" y="0"/>
-          <a:chExt cx="0" cy="0"/>
-        </a:xfrm>
-      </p:grpSpPr>
-      <p:sp>
-        <p:nvSpPr>
-          <p:cNvPr id="2" name="Titel 1"/>
-          <p:cNvSpPr>
-            <a:spLocks noGrp="1"/>
-          </p:cNvSpPr>
-          <p:nvPr>
-            <p:ph type="title"/>
-          </p:nvPr>
-        </p:nvSpPr>
-        <p:spPr/>
-        <p:txBody>
-          <a:bodyPr/>
-          <a:lstStyle/>
-          <a:p>
-            <a:r>
-              <a:rPr lang="de-DE" dirty="0" smtClean="0"/>
-              <a:t>Aufgetretene Probleme</a:t>
-            </a:r>
-            <a:endParaRPr lang="de-DE" dirty="0"/>
-          </a:p>
-        </p:txBody>
-      </p:sp>
-      <p:sp>
-        <p:nvSpPr>
-          <p:cNvPr id="3" name="Inhaltsplatzhalter 2"/>
-          <p:cNvSpPr>
-            <a:spLocks noGrp="1"/>
-          </p:cNvSpPr>
-          <p:nvPr>
-            <p:ph idx="1"/>
-          </p:nvPr>
-        </p:nvSpPr>
-        <p:spPr/>
-        <p:txBody>
-          <a:bodyPr>
-            <a:normAutofit fontScale="92500" lnSpcReduction="20000"/>
-          </a:bodyPr>
-          <a:lstStyle/>
-          <a:p>
-            <a:r>
-              <a:rPr lang="de-DE" dirty="0" smtClean="0">
-                <a:solidFill>
-                  <a:schemeClr val="accent2">
-                    <a:lumMod val="20000"/>
-                    <a:lumOff val="80000"/>
-                  </a:schemeClr>
-                </a:solidFill>
-              </a:rPr>
-              <a:t>ATmega168 reagierte nicht auf Befehle des Pis</a:t>
-            </a:r>
-          </a:p>
-          <a:p>
-            <a:endParaRPr lang="de-DE" dirty="0" smtClean="0">
-              <a:solidFill>
-                <a:schemeClr val="accent2">
-                  <a:lumMod val="20000"/>
-                  <a:lumOff val="80000"/>
-                </a:schemeClr>
-              </a:solidFill>
-            </a:endParaRPr>
-          </a:p>
-          <a:p>
-            <a:r>
-              <a:rPr lang="de-DE" dirty="0" smtClean="0">
-                <a:solidFill>
-                  <a:schemeClr val="accent2">
-                    <a:lumMod val="20000"/>
-                    <a:lumOff val="80000"/>
-                  </a:schemeClr>
-                </a:solidFill>
-              </a:rPr>
-              <a:t>Kompass gab unzuverlässige Daten aus</a:t>
-            </a:r>
-          </a:p>
-          <a:p>
-            <a:pPr lvl="1">
-              <a:buFont typeface="Wingdings"/>
-              <a:buChar char="à"/>
-            </a:pPr>
-            <a:r>
-              <a:rPr lang="de-DE" dirty="0" smtClean="0">
-                <a:solidFill>
-                  <a:schemeClr val="accent2">
-                    <a:lumMod val="20000"/>
-                    <a:lumOff val="80000"/>
-                  </a:schemeClr>
-                </a:solidFill>
-                <a:sym typeface="Wingdings" pitchFamily="2" charset="2"/>
-              </a:rPr>
-              <a:t>GPS-Modul auf Stange befestigt</a:t>
-            </a:r>
-          </a:p>
-          <a:p>
-            <a:pPr lvl="1">
-              <a:buFont typeface="Wingdings"/>
-              <a:buChar char="à"/>
-            </a:pPr>
-            <a:endParaRPr lang="de-DE" dirty="0" smtClean="0">
-              <a:solidFill>
-                <a:schemeClr val="accent2">
-                  <a:lumMod val="20000"/>
-                  <a:lumOff val="80000"/>
-                </a:schemeClr>
-              </a:solidFill>
-              <a:sym typeface="Wingdings" pitchFamily="2" charset="2"/>
-            </a:endParaRPr>
-          </a:p>
-          <a:p>
-            <a:r>
-              <a:rPr lang="de-DE" dirty="0" smtClean="0">
-                <a:solidFill>
-                  <a:schemeClr val="accent2">
-                    <a:lumMod val="20000"/>
-                    <a:lumOff val="80000"/>
-                  </a:schemeClr>
-                </a:solidFill>
-                <a:sym typeface="Wingdings" pitchFamily="2" charset="2"/>
-              </a:rPr>
-              <a:t>Ultraschallsensoren sahen Boden als Hindernis</a:t>
-            </a:r>
-          </a:p>
-          <a:p>
-            <a:pPr lvl="1">
-              <a:buFont typeface="Wingdings"/>
-              <a:buChar char="à"/>
-            </a:pPr>
-            <a:r>
-              <a:rPr lang="de-DE" dirty="0" smtClean="0">
-                <a:solidFill>
-                  <a:schemeClr val="accent2">
-                    <a:lumMod val="20000"/>
-                    <a:lumOff val="80000"/>
-                  </a:schemeClr>
-                </a:solidFill>
-                <a:sym typeface="Wingdings" pitchFamily="2" charset="2"/>
-              </a:rPr>
-              <a:t>mit Podest erhöht &amp; leicht nach oben geneigt</a:t>
-            </a:r>
-          </a:p>
-          <a:p>
-            <a:pPr lvl="1">
-              <a:buFont typeface="Wingdings"/>
-              <a:buChar char="à"/>
-            </a:pPr>
-            <a:endParaRPr lang="de-DE" dirty="0" smtClean="0">
-              <a:solidFill>
-                <a:schemeClr val="accent2">
-                  <a:lumMod val="20000"/>
-                  <a:lumOff val="80000"/>
-                </a:schemeClr>
-              </a:solidFill>
-              <a:sym typeface="Wingdings" pitchFamily="2" charset="2"/>
-            </a:endParaRPr>
-          </a:p>
-          <a:p>
-            <a:r>
-              <a:rPr lang="de-DE" dirty="0" smtClean="0">
-                <a:solidFill>
-                  <a:schemeClr val="accent2">
-                    <a:lumMod val="20000"/>
-                    <a:lumOff val="80000"/>
-                  </a:schemeClr>
-                </a:solidFill>
-                <a:sym typeface="Wingdings" pitchFamily="2" charset="2"/>
-              </a:rPr>
-              <a:t>Zusammenspiel von Navigationsfunktion und Hinderniserkennung brachte schlechte Ergebnisse</a:t>
-            </a:r>
-          </a:p>
-        </p:txBody>
-      </p:sp>
       <p:sp>
         <p:nvSpPr>
           <p:cNvPr id="4" name="Foliennummernplatzhalter 3"/>
@@ -9647,7 +9894,7 @@
       </p:grpSpPr>
       <p:sp>
         <p:nvSpPr>
-          <p:cNvPr id="2" name="Titel 1"/>
+          <p:cNvPr id="2" name="Title 1"/>
           <p:cNvSpPr>
             <a:spLocks noGrp="1"/>
           </p:cNvSpPr>
@@ -9657,20 +9904,21 @@
         </p:nvSpPr>
         <p:spPr/>
         <p:txBody>
-          <a:bodyPr/>
-          <a:lstStyle/>
-          <a:p>
-            <a:r>
-              <a:rPr lang="de-DE" dirty="0" smtClean="0"/>
-              <a:t>Ausblick</a:t>
-            </a:r>
-            <a:endParaRPr lang="de-DE" dirty="0"/>
-          </a:p>
-        </p:txBody>
-      </p:sp>
-      <p:sp>
-        <p:nvSpPr>
-          <p:cNvPr id="3" name="Inhaltsplatzhalter 2"/>
+          <a:bodyPr>
+            <a:normAutofit/>
+          </a:bodyPr>
+          <a:lstStyle/>
+          <a:p>
+            <a:r>
+              <a:rPr lang="en-US"/>
+              <a:t>Hinderniserkennung</a:t>
+            </a:r>
+          </a:p>
+        </p:txBody>
+      </p:sp>
+      <p:sp>
+        <p:nvSpPr>
+          <p:cNvPr id="3" name="Content Placeholder 2"/>
           <p:cNvSpPr>
             <a:spLocks noGrp="1"/>
           </p:cNvSpPr>
@@ -9683,86 +9931,20 @@
           <a:bodyPr/>
           <a:lstStyle/>
           <a:p>
-            <a:pPr>
-              <a:buNone/>
-            </a:pPr>
-            <a:endParaRPr lang="de-DE" dirty="0" smtClean="0">
-              <a:solidFill>
-                <a:schemeClr val="accent2">
-                  <a:lumMod val="20000"/>
-                  <a:lumOff val="80000"/>
-                </a:schemeClr>
-              </a:solidFill>
-            </a:endParaRPr>
-          </a:p>
-          <a:p>
-            <a:r>
-              <a:rPr lang="de-DE" dirty="0" smtClean="0">
-                <a:solidFill>
-                  <a:schemeClr val="accent2">
-                    <a:lumMod val="20000"/>
-                    <a:lumOff val="80000"/>
-                  </a:schemeClr>
-                </a:solidFill>
-              </a:rPr>
-              <a:t>Erweiterung des Projekts durch:</a:t>
-            </a:r>
-          </a:p>
-          <a:p>
-            <a:pPr lvl="1"/>
-            <a:r>
-              <a:rPr lang="de-DE" dirty="0" smtClean="0">
-                <a:solidFill>
-                  <a:schemeClr val="accent2">
-                    <a:lumMod val="20000"/>
-                    <a:lumOff val="80000"/>
-                  </a:schemeClr>
-                </a:solidFill>
-              </a:rPr>
-              <a:t>Hinderniserkennung über Kamera</a:t>
-            </a:r>
-          </a:p>
-          <a:p>
-            <a:pPr lvl="1"/>
-            <a:r>
-              <a:rPr lang="de-DE" dirty="0" smtClean="0">
-                <a:solidFill>
-                  <a:schemeClr val="accent2">
-                    <a:lumMod val="20000"/>
-                    <a:lumOff val="80000"/>
-                  </a:schemeClr>
-                </a:solidFill>
-              </a:rPr>
-              <a:t>Routenplanung</a:t>
-            </a:r>
-          </a:p>
-          <a:p>
-            <a:pPr lvl="1"/>
-            <a:r>
-              <a:rPr lang="de-DE" dirty="0" smtClean="0">
-                <a:solidFill>
-                  <a:schemeClr val="accent2">
-                    <a:lumMod val="20000"/>
-                    <a:lumOff val="80000"/>
-                  </a:schemeClr>
-                </a:solidFill>
-              </a:rPr>
-              <a:t>Geschwindigkeitsmodulation</a:t>
-            </a:r>
-            <a:endParaRPr lang="de-DE" dirty="0">
-              <a:solidFill>
-                <a:schemeClr val="accent2">
-                  <a:lumMod val="20000"/>
-                  <a:lumOff val="80000"/>
-                </a:schemeClr>
-              </a:solidFill>
-            </a:endParaRPr>
-          </a:p>
-        </p:txBody>
-      </p:sp>
-      <p:sp>
-        <p:nvSpPr>
-          <p:cNvPr id="4" name="Foliennummernplatzhalter 3"/>
+            <a:r>
+              <a:rPr lang="en-US">
+                <a:solidFill>
+                  <a:srgbClr val="DDDDDD"/>
+                </a:solidFill>
+              </a:rPr>
+              <a:t>Der Weg dahin</a:t>
+            </a:r>
+          </a:p>
+        </p:txBody>
+      </p:sp>
+      <p:sp>
+        <p:nvSpPr>
+          <p:cNvPr id="4" name="Slide Number Placeholder 3"/>
           <p:cNvSpPr>
             <a:spLocks noGrp="1"/>
           </p:cNvSpPr>
@@ -9784,17 +9966,15 @@
         </p:txBody>
       </p:sp>
     </p:spTree>
+    <p:extLst>
+      <p:ext uri="{BB962C8B-B14F-4D97-AF65-F5344CB8AC3E}">
+        <p14:creationId xmlns:p14="http://schemas.microsoft.com/office/powerpoint/2010/main" val="1269166034"/>
+      </p:ext>
+    </p:extLst>
   </p:cSld>
   <p:clrMapOvr>
     <a:masterClrMapping/>
   </p:clrMapOvr>
-  <p:timing>
-    <p:tnLst>
-      <p:par>
-        <p:cTn xmlns:p14="http://schemas.microsoft.com/office/powerpoint/2010/main" id="1" dur="indefinite" restart="never" nodeType="tmRoot"/>
-      </p:par>
-    </p:tnLst>
-  </p:timing>
 </p:sld>
 </file>
 
@@ -9817,6 +9997,609 @@
       </p:grpSpPr>
       <p:sp>
         <p:nvSpPr>
+          <p:cNvPr id="2" name="Title 1"/>
+          <p:cNvSpPr>
+            <a:spLocks noGrp="1"/>
+          </p:cNvSpPr>
+          <p:nvPr>
+            <p:ph type="title"/>
+          </p:nvPr>
+        </p:nvSpPr>
+        <p:spPr/>
+        <p:txBody>
+          <a:bodyPr/>
+          <a:lstStyle/>
+          <a:p>
+            <a:r>
+              <a:rPr lang="en-US" dirty="0" err="1" smtClean="0"/>
+              <a:t>Hinderniserkennung</a:t>
+            </a:r>
+            <a:endParaRPr lang="en-US" dirty="0"/>
+          </a:p>
+        </p:txBody>
+      </p:sp>
+      <p:sp>
+        <p:nvSpPr>
+          <p:cNvPr id="3" name="Content Placeholder 2"/>
+          <p:cNvSpPr>
+            <a:spLocks noGrp="1"/>
+          </p:cNvSpPr>
+          <p:nvPr>
+            <p:ph idx="1"/>
+          </p:nvPr>
+        </p:nvSpPr>
+        <p:spPr>
+          <a:xfrm>
+            <a:off x="457200" y="2852937"/>
+            <a:ext cx="8229600" cy="2470118"/>
+          </a:xfrm>
+        </p:spPr>
+        <p:txBody>
+          <a:bodyPr/>
+          <a:lstStyle/>
+          <a:p>
+            <a:r>
+              <a:rPr lang="en-US" dirty="0" err="1" smtClean="0">
+                <a:solidFill>
+                  <a:srgbClr val="F0F0F0"/>
+                </a:solidFill>
+              </a:rPr>
+              <a:t>Herausforderungen</a:t>
+            </a:r>
+            <a:r>
+              <a:rPr lang="en-US" dirty="0" smtClean="0">
+                <a:solidFill>
+                  <a:srgbClr val="F0F0F0"/>
+                </a:solidFill>
+              </a:rPr>
+              <a:t>:</a:t>
+            </a:r>
+          </a:p>
+          <a:p>
+            <a:pPr lvl="1"/>
+            <a:r>
+              <a:rPr lang="en-US" dirty="0" err="1" smtClean="0">
+                <a:solidFill>
+                  <a:srgbClr val="F0F0F0"/>
+                </a:solidFill>
+              </a:rPr>
+              <a:t>Reflexionen</a:t>
+            </a:r>
+            <a:r>
+              <a:rPr lang="en-US" dirty="0" smtClean="0">
+                <a:solidFill>
+                  <a:srgbClr val="F0F0F0"/>
+                </a:solidFill>
+              </a:rPr>
+              <a:t> am </a:t>
+            </a:r>
+            <a:r>
+              <a:rPr lang="en-US" dirty="0" err="1" smtClean="0">
+                <a:solidFill>
+                  <a:srgbClr val="F0F0F0"/>
+                </a:solidFill>
+              </a:rPr>
+              <a:t>Boden</a:t>
+            </a:r>
+            <a:endParaRPr lang="en-US" dirty="0">
+              <a:solidFill>
+                <a:srgbClr val="F0F0F0"/>
+              </a:solidFill>
+            </a:endParaRPr>
+          </a:p>
+          <a:p>
+            <a:pPr lvl="1"/>
+            <a:r>
+              <a:rPr lang="en-US" dirty="0" err="1" smtClean="0">
+                <a:solidFill>
+                  <a:srgbClr val="F0F0F0"/>
+                </a:solidFill>
+              </a:rPr>
+              <a:t>Frontale</a:t>
+            </a:r>
+            <a:r>
+              <a:rPr lang="en-US" dirty="0" smtClean="0">
+                <a:solidFill>
+                  <a:srgbClr val="F0F0F0"/>
+                </a:solidFill>
+              </a:rPr>
+              <a:t> </a:t>
+            </a:r>
+            <a:r>
+              <a:rPr lang="en-US" dirty="0" err="1" smtClean="0">
+                <a:solidFill>
+                  <a:srgbClr val="F0F0F0"/>
+                </a:solidFill>
+              </a:rPr>
+              <a:t>Objekte</a:t>
+            </a:r>
+            <a:endParaRPr lang="en-US" dirty="0">
+              <a:solidFill>
+                <a:srgbClr val="F0F0F0"/>
+              </a:solidFill>
+            </a:endParaRPr>
+          </a:p>
+          <a:p>
+            <a:pPr lvl="1"/>
+            <a:r>
+              <a:rPr lang="en-US" dirty="0" err="1" smtClean="0">
+                <a:solidFill>
+                  <a:srgbClr val="F0F0F0"/>
+                </a:solidFill>
+              </a:rPr>
+              <a:t>Spontane</a:t>
+            </a:r>
+            <a:r>
+              <a:rPr lang="en-US" dirty="0" smtClean="0">
+                <a:solidFill>
+                  <a:srgbClr val="F0F0F0"/>
+                </a:solidFill>
+              </a:rPr>
+              <a:t> </a:t>
+            </a:r>
+            <a:r>
+              <a:rPr lang="en-US" dirty="0" err="1" smtClean="0">
+                <a:solidFill>
+                  <a:srgbClr val="F0F0F0"/>
+                </a:solidFill>
+              </a:rPr>
+              <a:t>Ausreißer</a:t>
+            </a:r>
+            <a:endParaRPr lang="en-US" dirty="0" smtClean="0">
+              <a:solidFill>
+                <a:srgbClr val="F0F0F0"/>
+              </a:solidFill>
+            </a:endParaRPr>
+          </a:p>
+          <a:p>
+            <a:pPr lvl="1"/>
+            <a:endParaRPr lang="en-US" dirty="0">
+              <a:solidFill>
+                <a:srgbClr val="F0F0F0"/>
+              </a:solidFill>
+            </a:endParaRPr>
+          </a:p>
+        </p:txBody>
+      </p:sp>
+      <p:sp>
+        <p:nvSpPr>
+          <p:cNvPr id="4" name="Slide Number Placeholder 3"/>
+          <p:cNvSpPr>
+            <a:spLocks noGrp="1"/>
+          </p:cNvSpPr>
+          <p:nvPr>
+            <p:ph type="sldNum" sz="quarter" idx="12"/>
+          </p:nvPr>
+        </p:nvSpPr>
+        <p:spPr/>
+        <p:txBody>
+          <a:bodyPr/>
+          <a:lstStyle/>
+          <a:p>
+            <a:fld id="{E81C4A6D-0315-4A09-8D5A-3A65F767D07B}" type="slidenum">
+              <a:rPr lang="de-DE" smtClean="0"/>
+              <a:t>24</a:t>
+            </a:fld>
+            <a:endParaRPr lang="de-DE"/>
+          </a:p>
+        </p:txBody>
+      </p:sp>
+    </p:spTree>
+    <p:extLst>
+      <p:ext uri="{BB962C8B-B14F-4D97-AF65-F5344CB8AC3E}">
+        <p14:creationId xmlns:p14="http://schemas.microsoft.com/office/powerpoint/2010/main" val="27762390"/>
+      </p:ext>
+    </p:extLst>
+  </p:cSld>
+  <p:clrMapOvr>
+    <a:masterClrMapping/>
+  </p:clrMapOvr>
+</p:sld>
+</file>
+
+<file path=ppt/slides/slide25.xml><?xml version="1.0" encoding="utf-8"?>
+<p:sld xmlns:a="http://schemas.openxmlformats.org/drawingml/2006/main" xmlns:r="http://schemas.openxmlformats.org/officeDocument/2006/relationships" xmlns:p="http://schemas.openxmlformats.org/presentationml/2006/main">
+  <p:cSld>
+    <p:spTree>
+      <p:nvGrpSpPr>
+        <p:cNvPr id="1" name=""/>
+        <p:cNvGrpSpPr/>
+        <p:nvPr/>
+      </p:nvGrpSpPr>
+      <p:grpSpPr>
+        <a:xfrm>
+          <a:off x="0" y="0"/>
+          <a:ext cx="0" cy="0"/>
+          <a:chOff x="0" y="0"/>
+          <a:chExt cx="0" cy="0"/>
+        </a:xfrm>
+      </p:grpSpPr>
+      <p:sp>
+        <p:nvSpPr>
+          <p:cNvPr id="2" name="Titel 1"/>
+          <p:cNvSpPr>
+            <a:spLocks noGrp="1"/>
+          </p:cNvSpPr>
+          <p:nvPr>
+            <p:ph type="title"/>
+          </p:nvPr>
+        </p:nvSpPr>
+        <p:spPr/>
+        <p:txBody>
+          <a:bodyPr/>
+          <a:lstStyle/>
+          <a:p>
+            <a:r>
+              <a:rPr lang="de-DE" dirty="0" smtClean="0"/>
+              <a:t>Zusammenspiel</a:t>
+            </a:r>
+            <a:endParaRPr lang="de-DE" dirty="0"/>
+          </a:p>
+        </p:txBody>
+      </p:sp>
+      <p:sp>
+        <p:nvSpPr>
+          <p:cNvPr id="5" name="Inhaltsplatzhalter 4"/>
+          <p:cNvSpPr>
+            <a:spLocks noGrp="1"/>
+          </p:cNvSpPr>
+          <p:nvPr>
+            <p:ph idx="1"/>
+          </p:nvPr>
+        </p:nvSpPr>
+        <p:spPr/>
+        <p:txBody>
+          <a:bodyPr/>
+          <a:lstStyle/>
+          <a:p>
+            <a:endParaRPr lang="de-DE"/>
+          </a:p>
+        </p:txBody>
+      </p:sp>
+      <p:pic>
+        <p:nvPicPr>
+          <p:cNvPr id="2050" name="Picture 2" descr="I:\AAAUni\3.Semester\A Robotik-Praktikum\Bilder Doku\main.py2.jpg"/>
+          <p:cNvPicPr>
+            <a:picLocks noChangeAspect="1" noChangeArrowheads="1"/>
+          </p:cNvPicPr>
+          <p:nvPr/>
+        </p:nvPicPr>
+        <p:blipFill>
+          <a:blip r:embed="rId3"/>
+          <a:srcRect/>
+          <a:stretch>
+            <a:fillRect/>
+          </a:stretch>
+        </p:blipFill>
+        <p:spPr bwMode="auto">
+          <a:xfrm>
+            <a:off x="0" y="2000240"/>
+            <a:ext cx="9144702" cy="4132271"/>
+          </a:xfrm>
+          <a:prstGeom prst="rect">
+            <a:avLst/>
+          </a:prstGeom>
+          <a:noFill/>
+        </p:spPr>
+      </p:pic>
+      <p:sp>
+        <p:nvSpPr>
+          <p:cNvPr id="7" name="Foliennummernplatzhalter 6"/>
+          <p:cNvSpPr>
+            <a:spLocks noGrp="1"/>
+          </p:cNvSpPr>
+          <p:nvPr>
+            <p:ph type="sldNum" sz="quarter" idx="12"/>
+          </p:nvPr>
+        </p:nvSpPr>
+        <p:spPr/>
+        <p:txBody>
+          <a:bodyPr/>
+          <a:lstStyle/>
+          <a:p>
+            <a:fld id="{E81C4A6D-0315-4A09-8D5A-3A65F767D07B}" type="slidenum">
+              <a:rPr lang="de-DE" smtClean="0"/>
+              <a:t>25</a:t>
+            </a:fld>
+            <a:endParaRPr lang="de-DE"/>
+          </a:p>
+        </p:txBody>
+      </p:sp>
+    </p:spTree>
+  </p:cSld>
+  <p:clrMapOvr>
+    <a:masterClrMapping/>
+  </p:clrMapOvr>
+  <p:timing>
+    <p:tnLst>
+      <p:par>
+        <p:cTn xmlns:p14="http://schemas.microsoft.com/office/powerpoint/2010/main" id="1" dur="indefinite" restart="never" nodeType="tmRoot"/>
+      </p:par>
+    </p:tnLst>
+  </p:timing>
+</p:sld>
+</file>
+
+<file path=ppt/slides/slide26.xml><?xml version="1.0" encoding="utf-8"?>
+<p:sld xmlns:a="http://schemas.openxmlformats.org/drawingml/2006/main" xmlns:r="http://schemas.openxmlformats.org/officeDocument/2006/relationships" xmlns:p="http://schemas.openxmlformats.org/presentationml/2006/main">
+  <p:cSld>
+    <p:spTree>
+      <p:nvGrpSpPr>
+        <p:cNvPr id="1" name=""/>
+        <p:cNvGrpSpPr/>
+        <p:nvPr/>
+      </p:nvGrpSpPr>
+      <p:grpSpPr>
+        <a:xfrm>
+          <a:off x="0" y="0"/>
+          <a:ext cx="0" cy="0"/>
+          <a:chOff x="0" y="0"/>
+          <a:chExt cx="0" cy="0"/>
+        </a:xfrm>
+      </p:grpSpPr>
+      <p:sp>
+        <p:nvSpPr>
+          <p:cNvPr id="2" name="Titel 1"/>
+          <p:cNvSpPr>
+            <a:spLocks noGrp="1"/>
+          </p:cNvSpPr>
+          <p:nvPr>
+            <p:ph type="title"/>
+          </p:nvPr>
+        </p:nvSpPr>
+        <p:spPr/>
+        <p:txBody>
+          <a:bodyPr/>
+          <a:lstStyle/>
+          <a:p>
+            <a:r>
+              <a:rPr lang="de-DE" dirty="0" smtClean="0"/>
+              <a:t>Ausblick</a:t>
+            </a:r>
+            <a:endParaRPr lang="de-DE" dirty="0"/>
+          </a:p>
+        </p:txBody>
+      </p:sp>
+      <p:sp>
+        <p:nvSpPr>
+          <p:cNvPr id="3" name="Inhaltsplatzhalter 2"/>
+          <p:cNvSpPr>
+            <a:spLocks noGrp="1"/>
+          </p:cNvSpPr>
+          <p:nvPr>
+            <p:ph idx="1"/>
+          </p:nvPr>
+        </p:nvSpPr>
+        <p:spPr/>
+        <p:txBody>
+          <a:bodyPr/>
+          <a:lstStyle/>
+          <a:p>
+            <a:pPr>
+              <a:buNone/>
+            </a:pPr>
+            <a:endParaRPr lang="de-DE" dirty="0" smtClean="0">
+              <a:solidFill>
+                <a:schemeClr val="accent2">
+                  <a:lumMod val="20000"/>
+                  <a:lumOff val="80000"/>
+                </a:schemeClr>
+              </a:solidFill>
+            </a:endParaRPr>
+          </a:p>
+          <a:p>
+            <a:r>
+              <a:rPr lang="de-DE" dirty="0" smtClean="0">
+                <a:solidFill>
+                  <a:schemeClr val="accent2">
+                    <a:lumMod val="20000"/>
+                    <a:lumOff val="80000"/>
+                  </a:schemeClr>
+                </a:solidFill>
+              </a:rPr>
+              <a:t>Erweiterung des Projekts durch:</a:t>
+            </a:r>
+          </a:p>
+          <a:p>
+            <a:pPr lvl="1"/>
+            <a:r>
+              <a:rPr lang="de-DE" dirty="0" smtClean="0">
+                <a:solidFill>
+                  <a:schemeClr val="accent2">
+                    <a:lumMod val="20000"/>
+                    <a:lumOff val="80000"/>
+                  </a:schemeClr>
+                </a:solidFill>
+              </a:rPr>
+              <a:t>Hinderniserkennung über Kamera</a:t>
+            </a:r>
+          </a:p>
+          <a:p>
+            <a:pPr lvl="1"/>
+            <a:r>
+              <a:rPr lang="de-DE" dirty="0" smtClean="0">
+                <a:solidFill>
+                  <a:schemeClr val="accent2">
+                    <a:lumMod val="20000"/>
+                    <a:lumOff val="80000"/>
+                  </a:schemeClr>
+                </a:solidFill>
+              </a:rPr>
+              <a:t>Routenplanung</a:t>
+            </a:r>
+          </a:p>
+          <a:p>
+            <a:pPr lvl="1"/>
+            <a:r>
+              <a:rPr lang="de-DE" dirty="0" smtClean="0">
+                <a:solidFill>
+                  <a:schemeClr val="accent2">
+                    <a:lumMod val="20000"/>
+                    <a:lumOff val="80000"/>
+                  </a:schemeClr>
+                </a:solidFill>
+              </a:rPr>
+              <a:t>Geschwindigkeitsmodulation</a:t>
+            </a:r>
+            <a:endParaRPr lang="de-DE" dirty="0">
+              <a:solidFill>
+                <a:schemeClr val="accent2">
+                  <a:lumMod val="20000"/>
+                  <a:lumOff val="80000"/>
+                </a:schemeClr>
+              </a:solidFill>
+            </a:endParaRPr>
+          </a:p>
+        </p:txBody>
+      </p:sp>
+      <p:sp>
+        <p:nvSpPr>
+          <p:cNvPr id="4" name="Foliennummernplatzhalter 3"/>
+          <p:cNvSpPr>
+            <a:spLocks noGrp="1"/>
+          </p:cNvSpPr>
+          <p:nvPr>
+            <p:ph type="sldNum" sz="quarter" idx="12"/>
+          </p:nvPr>
+        </p:nvSpPr>
+        <p:spPr/>
+        <p:txBody>
+          <a:bodyPr/>
+          <a:lstStyle/>
+          <a:p>
+            <a:fld id="{E81C4A6D-0315-4A09-8D5A-3A65F767D07B}" type="slidenum">
+              <a:rPr lang="de-DE" smtClean="0"/>
+              <a:t>26</a:t>
+            </a:fld>
+            <a:endParaRPr lang="de-DE"/>
+          </a:p>
+        </p:txBody>
+      </p:sp>
+    </p:spTree>
+  </p:cSld>
+  <p:clrMapOvr>
+    <a:masterClrMapping/>
+  </p:clrMapOvr>
+  <p:timing>
+    <p:tnLst>
+      <p:par>
+        <p:cTn xmlns:p14="http://schemas.microsoft.com/office/powerpoint/2010/main" id="1" dur="indefinite" restart="never" nodeType="tmRoot"/>
+      </p:par>
+    </p:tnLst>
+  </p:timing>
+</p:sld>
+</file>
+
+<file path=ppt/slides/slide27.xml><?xml version="1.0" encoding="utf-8"?>
+<p:sld xmlns:a="http://schemas.openxmlformats.org/drawingml/2006/main" xmlns:r="http://schemas.openxmlformats.org/officeDocument/2006/relationships" xmlns:p="http://schemas.openxmlformats.org/presentationml/2006/main">
+  <p:cSld>
+    <p:spTree>
+      <p:nvGrpSpPr>
+        <p:cNvPr id="1" name=""/>
+        <p:cNvGrpSpPr/>
+        <p:nvPr/>
+      </p:nvGrpSpPr>
+      <p:grpSpPr>
+        <a:xfrm>
+          <a:off x="0" y="0"/>
+          <a:ext cx="0" cy="0"/>
+          <a:chOff x="0" y="0"/>
+          <a:chExt cx="0" cy="0"/>
+        </a:xfrm>
+      </p:grpSpPr>
+      <p:sp>
+        <p:nvSpPr>
+          <p:cNvPr id="2" name="Title 1"/>
+          <p:cNvSpPr>
+            <a:spLocks noGrp="1"/>
+          </p:cNvSpPr>
+          <p:nvPr>
+            <p:ph type="title"/>
+          </p:nvPr>
+        </p:nvSpPr>
+        <p:spPr/>
+        <p:txBody>
+          <a:bodyPr/>
+          <a:lstStyle/>
+          <a:p>
+            <a:endParaRPr lang="en-US"/>
+          </a:p>
+        </p:txBody>
+      </p:sp>
+      <p:sp>
+        <p:nvSpPr>
+          <p:cNvPr id="3" name="Content Placeholder 2"/>
+          <p:cNvSpPr>
+            <a:spLocks noGrp="1"/>
+          </p:cNvSpPr>
+          <p:nvPr>
+            <p:ph idx="1"/>
+          </p:nvPr>
+        </p:nvSpPr>
+        <p:spPr/>
+        <p:txBody>
+          <a:bodyPr/>
+          <a:lstStyle/>
+          <a:p>
+            <a:endParaRPr lang="en-US"/>
+          </a:p>
+        </p:txBody>
+      </p:sp>
+      <p:sp>
+        <p:nvSpPr>
+          <p:cNvPr id="4" name="Slide Number Placeholder 3"/>
+          <p:cNvSpPr>
+            <a:spLocks noGrp="1"/>
+          </p:cNvSpPr>
+          <p:nvPr>
+            <p:ph type="sldNum" sz="quarter" idx="12"/>
+          </p:nvPr>
+        </p:nvSpPr>
+        <p:spPr/>
+        <p:txBody>
+          <a:bodyPr/>
+          <a:lstStyle/>
+          <a:p>
+            <a:fld id="{E81C4A6D-0315-4A09-8D5A-3A65F767D07B}" type="slidenum">
+              <a:rPr lang="de-DE" smtClean="0"/>
+              <a:t>27</a:t>
+            </a:fld>
+            <a:endParaRPr lang="de-DE"/>
+          </a:p>
+        </p:txBody>
+      </p:sp>
+    </p:spTree>
+    <p:extLst>
+      <p:ext uri="{BB962C8B-B14F-4D97-AF65-F5344CB8AC3E}">
+        <p14:creationId xmlns:p14="http://schemas.microsoft.com/office/powerpoint/2010/main" val="3748320143"/>
+      </p:ext>
+    </p:extLst>
+  </p:cSld>
+  <p:clrMapOvr>
+    <a:masterClrMapping/>
+  </p:clrMapOvr>
+</p:sld>
+</file>
+
+<file path=ppt/slides/slide28.xml><?xml version="1.0" encoding="utf-8"?>
+<p:sld xmlns:a="http://schemas.openxmlformats.org/drawingml/2006/main" xmlns:r="http://schemas.openxmlformats.org/officeDocument/2006/relationships" xmlns:p="http://schemas.openxmlformats.org/presentationml/2006/main">
+  <p:cSld>
+    <p:spTree>
+      <p:nvGrpSpPr>
+        <p:cNvPr id="1" name=""/>
+        <p:cNvGrpSpPr/>
+        <p:nvPr/>
+      </p:nvGrpSpPr>
+      <p:grpSpPr>
+        <a:xfrm>
+          <a:off x="0" y="0"/>
+          <a:ext cx="0" cy="0"/>
+          <a:chOff x="0" y="0"/>
+          <a:chExt cx="0" cy="0"/>
+        </a:xfrm>
+      </p:grpSpPr>
+      <p:sp>
+        <p:nvSpPr>
           <p:cNvPr id="2" name="Titel 1"/>
           <p:cNvSpPr>
             <a:spLocks noGrp="1"/>
@@ -9861,7 +10644,7 @@
           <a:p>
             <a:fld id="{E81C4A6D-0315-4A09-8D5A-3A65F767D07B}" type="slidenum">
               <a:rPr lang="de-DE" smtClean="0"/>
-              <a:t>24</a:t>
+              <a:t>28</a:t>
             </a:fld>
             <a:endParaRPr lang="de-DE"/>
           </a:p>

</xml_diff>

<commit_message>
FP-Vortrag, Iteration nummero drei
</commit_message>
<xml_diff>
--- a/GPS auf Rädern (FP).pptx
+++ b/GPS auf Rädern (FP).pptx
@@ -5,7 +5,7 @@
     <p:sldMasterId id="2147483684" r:id="rId1"/>
   </p:sldMasterIdLst>
   <p:notesMasterIdLst>
-    <p:notesMasterId r:id="rId30"/>
+    <p:notesMasterId r:id="rId29"/>
   </p:notesMasterIdLst>
   <p:sldIdLst>
     <p:sldId id="256" r:id="rId2"/>
@@ -34,8 +34,7 @@
     <p:sldId id="279" r:id="rId25"/>
     <p:sldId id="273" r:id="rId26"/>
     <p:sldId id="276" r:id="rId27"/>
-    <p:sldId id="286" r:id="rId28"/>
-    <p:sldId id="277" r:id="rId29"/>
+    <p:sldId id="277" r:id="rId28"/>
   </p:sldIdLst>
   <p:sldSz cx="9144000" cy="6858000" type="screen4x3"/>
   <p:notesSz cx="6858000" cy="9144000"/>
@@ -751,6 +750,139 @@
           <a:p>
             <a:r>
               <a:rPr lang="en-US"/>
+              <a:t>Lösungen:</a:t>
+            </a:r>
+            <a:br>
+              <a:rPr lang="en-US"/>
+            </a:br>
+            <a:r>
+              <a:rPr lang="en-US"/>
+              <a:t/>
+            </a:r>
+            <a:br>
+              <a:rPr lang="en-US"/>
+            </a:br>
+            <a:r>
+              <a:rPr lang="en-US"/>
+              <a:t>-</a:t>
+            </a:r>
+            <a:r>
+              <a:rPr lang="en-US" baseline="0"/>
+              <a:t> Reflexe: Sensoren höher angebracht und schräg nach oben. Maximalabstand angepasst</a:t>
+            </a:r>
+          </a:p>
+          <a:p>
+            <a:pPr marL="171450" indent="-171450">
+              <a:buFontTx/>
+              <a:buChar char="-"/>
+            </a:pPr>
+            <a:r>
+              <a:rPr lang="en-US" baseline="0"/>
+              <a:t>Frontale Objekte: Problem: Fehlerschwankung der Sensoren Einmal entschieden -&gt; große Änderung nötig für Richtungsänderung</a:t>
+            </a:r>
+          </a:p>
+          <a:p>
+            <a:pPr marL="171450" indent="-171450">
+              <a:buFontTx/>
+              <a:buChar char="-"/>
+            </a:pPr>
+            <a:r>
+              <a:rPr lang="en-US" baseline="0"/>
+              <a:t>Spontane Ausreißer: Maximalabstand</a:t>
+            </a:r>
+            <a:endParaRPr lang="en-US"/>
+          </a:p>
+        </p:txBody>
+      </p:sp>
+      <p:sp>
+        <p:nvSpPr>
+          <p:cNvPr id="4" name="Slide Number Placeholder 3"/>
+          <p:cNvSpPr>
+            <a:spLocks noGrp="1"/>
+          </p:cNvSpPr>
+          <p:nvPr>
+            <p:ph type="sldNum" sz="quarter" idx="10"/>
+          </p:nvPr>
+        </p:nvSpPr>
+        <p:spPr/>
+        <p:txBody>
+          <a:bodyPr/>
+          <a:lstStyle/>
+          <a:p>
+            <a:fld id="{3C1F6DE6-85C7-4B7B-9736-3E2B9216E239}" type="slidenum">
+              <a:rPr lang="de-DE" smtClean="0"/>
+              <a:t>24</a:t>
+            </a:fld>
+            <a:endParaRPr lang="de-DE"/>
+          </a:p>
+        </p:txBody>
+      </p:sp>
+    </p:spTree>
+    <p:extLst>
+      <p:ext uri="{BB962C8B-B14F-4D97-AF65-F5344CB8AC3E}">
+        <p14:creationId xmlns:p14="http://schemas.microsoft.com/office/powerpoint/2010/main" val="3374591116"/>
+      </p:ext>
+    </p:extLst>
+  </p:cSld>
+  <p:clrMapOvr>
+    <a:masterClrMapping/>
+  </p:clrMapOvr>
+</p:notes>
+</file>
+
+<file path=ppt/notesSlides/notesSlide11.xml><?xml version="1.0" encoding="utf-8"?>
+<p:notes xmlns:a="http://schemas.openxmlformats.org/drawingml/2006/main" xmlns:r="http://schemas.openxmlformats.org/officeDocument/2006/relationships" xmlns:p="http://schemas.openxmlformats.org/presentationml/2006/main">
+  <p:cSld>
+    <p:spTree>
+      <p:nvGrpSpPr>
+        <p:cNvPr id="1" name=""/>
+        <p:cNvGrpSpPr/>
+        <p:nvPr/>
+      </p:nvGrpSpPr>
+      <p:grpSpPr>
+        <a:xfrm>
+          <a:off x="0" y="0"/>
+          <a:ext cx="0" cy="0"/>
+          <a:chOff x="0" y="0"/>
+          <a:chExt cx="0" cy="0"/>
+        </a:xfrm>
+      </p:grpSpPr>
+      <p:sp>
+        <p:nvSpPr>
+          <p:cNvPr id="2" name="Slide Image Placeholder 1"/>
+          <p:cNvSpPr>
+            <a:spLocks noGrp="1" noRot="1" noChangeAspect="1"/>
+          </p:cNvSpPr>
+          <p:nvPr>
+            <p:ph type="sldImg"/>
+          </p:nvPr>
+        </p:nvSpPr>
+        <p:spPr/>
+      </p:sp>
+      <p:sp>
+        <p:nvSpPr>
+          <p:cNvPr id="3" name="Notes Placeholder 2"/>
+          <p:cNvSpPr>
+            <a:spLocks noGrp="1"/>
+          </p:cNvSpPr>
+          <p:nvPr>
+            <p:ph type="body" idx="1"/>
+          </p:nvPr>
+        </p:nvSpPr>
+        <p:spPr/>
+        <p:txBody>
+          <a:bodyPr/>
+          <a:lstStyle/>
+          <a:p>
+            <a:r>
+              <a:rPr lang="en-US"/>
+              <a:t>Technischer Ablauf</a:t>
+            </a:r>
+            <a:br>
+              <a:rPr lang="en-US"/>
+            </a:br>
+            <a:r>
+              <a:rPr lang="en-US"/>
               <a:t>Probleme</a:t>
             </a:r>
             <a:r>
@@ -1175,7 +1307,7 @@
           <a:p>
             <a:r>
               <a:rPr lang="en-US"/>
-              <a:t>TODO: tba</a:t>
+              <a:t>Erklären wie wir den Shit gemessen haben</a:t>
             </a:r>
           </a:p>
         </p:txBody>
@@ -1197,7 +1329,7 @@
           <a:p>
             <a:fld id="{3C1F6DE6-85C7-4B7B-9736-3E2B9216E239}" type="slidenum">
               <a:rPr lang="de-DE" smtClean="0"/>
-              <a:t>18</a:t>
+              <a:t>15</a:t>
             </a:fld>
             <a:endParaRPr lang="de-DE"/>
           </a:p>
@@ -1206,7 +1338,7 @@
     </p:spTree>
     <p:extLst>
       <p:ext uri="{BB962C8B-B14F-4D97-AF65-F5344CB8AC3E}">
-        <p14:creationId xmlns:p14="http://schemas.microsoft.com/office/powerpoint/2010/main" val="3832613316"/>
+        <p14:creationId xmlns:p14="http://schemas.microsoft.com/office/powerpoint/2010/main" val="713204793"/>
       </p:ext>
     </p:extLst>
   </p:cSld>
@@ -1284,7 +1416,7 @@
           <a:p>
             <a:fld id="{3C1F6DE6-85C7-4B7B-9736-3E2B9216E239}" type="slidenum">
               <a:rPr lang="de-DE" smtClean="0"/>
-              <a:t>19</a:t>
+              <a:t>18</a:t>
             </a:fld>
             <a:endParaRPr lang="de-DE"/>
           </a:p>
@@ -1293,7 +1425,7 @@
     </p:spTree>
     <p:extLst>
       <p:ext uri="{BB962C8B-B14F-4D97-AF65-F5344CB8AC3E}">
-        <p14:creationId xmlns:p14="http://schemas.microsoft.com/office/powerpoint/2010/main" val="2862508042"/>
+        <p14:creationId xmlns:p14="http://schemas.microsoft.com/office/powerpoint/2010/main" val="3832613316"/>
       </p:ext>
     </p:extLst>
   </p:cSld>
@@ -1371,7 +1503,7 @@
           <a:p>
             <a:fld id="{3C1F6DE6-85C7-4B7B-9736-3E2B9216E239}" type="slidenum">
               <a:rPr lang="de-DE" smtClean="0"/>
-              <a:t>21</a:t>
+              <a:t>19</a:t>
             </a:fld>
             <a:endParaRPr lang="de-DE"/>
           </a:p>
@@ -1380,7 +1512,7 @@
     </p:spTree>
     <p:extLst>
       <p:ext uri="{BB962C8B-B14F-4D97-AF65-F5344CB8AC3E}">
-        <p14:creationId xmlns:p14="http://schemas.microsoft.com/office/powerpoint/2010/main" val="3202572473"/>
+        <p14:creationId xmlns:p14="http://schemas.microsoft.com/office/powerpoint/2010/main" val="2862508042"/>
       </p:ext>
     </p:extLst>
   </p:cSld>
@@ -1436,13 +1568,8 @@
           <a:p>
             <a:r>
               <a:rPr lang="en-US"/>
-              <a:t>TODO:</a:t>
-            </a:r>
-            <a:r>
-              <a:rPr lang="en-US" baseline="0"/>
-              <a:t> tba</a:t>
-            </a:r>
-            <a:endParaRPr lang="en-US"/>
+              <a:t>TODO: tba</a:t>
+            </a:r>
           </a:p>
         </p:txBody>
       </p:sp>
@@ -1463,7 +1590,7 @@
           <a:p>
             <a:fld id="{3C1F6DE6-85C7-4B7B-9736-3E2B9216E239}" type="slidenum">
               <a:rPr lang="de-DE" smtClean="0"/>
-              <a:t>23</a:t>
+              <a:t>21</a:t>
             </a:fld>
             <a:endParaRPr lang="de-DE"/>
           </a:p>
@@ -1472,7 +1599,7 @@
     </p:spTree>
     <p:extLst>
       <p:ext uri="{BB962C8B-B14F-4D97-AF65-F5344CB8AC3E}">
-        <p14:creationId xmlns:p14="http://schemas.microsoft.com/office/powerpoint/2010/main" val="450506952"/>
+        <p14:creationId xmlns:p14="http://schemas.microsoft.com/office/powerpoint/2010/main" val="3202572473"/>
       </p:ext>
     </p:extLst>
   </p:cSld>
@@ -1526,6 +1653,14 @@
           <a:bodyPr/>
           <a:lstStyle/>
           <a:p>
+            <a:r>
+              <a:rPr lang="en-US"/>
+              <a:t>TODO:</a:t>
+            </a:r>
+            <a:r>
+              <a:rPr lang="en-US" baseline="0"/>
+              <a:t> tba</a:t>
+            </a:r>
             <a:endParaRPr lang="en-US"/>
           </a:p>
         </p:txBody>
@@ -1547,7 +1682,7 @@
           <a:p>
             <a:fld id="{3C1F6DE6-85C7-4B7B-9736-3E2B9216E239}" type="slidenum">
               <a:rPr lang="de-DE" smtClean="0"/>
-              <a:t>24</a:t>
+              <a:t>23</a:t>
             </a:fld>
             <a:endParaRPr lang="de-DE"/>
           </a:p>
@@ -1556,7 +1691,7 @@
     </p:spTree>
     <p:extLst>
       <p:ext uri="{BB962C8B-B14F-4D97-AF65-F5344CB8AC3E}">
-        <p14:creationId xmlns:p14="http://schemas.microsoft.com/office/powerpoint/2010/main" val="3374591116"/>
+        <p14:creationId xmlns:p14="http://schemas.microsoft.com/office/powerpoint/2010/main" val="450506952"/>
       </p:ext>
     </p:extLst>
   </p:cSld>
@@ -8245,7 +8380,7 @@
           <p:nvPr/>
         </p:nvPicPr>
         <p:blipFill>
-          <a:blip r:embed="rId2"/>
+          <a:blip r:embed="rId3"/>
           <a:srcRect/>
           <a:stretch>
             <a:fillRect/>
@@ -10509,97 +10644,6 @@
       </p:grpSpPr>
       <p:sp>
         <p:nvSpPr>
-          <p:cNvPr id="2" name="Title 1"/>
-          <p:cNvSpPr>
-            <a:spLocks noGrp="1"/>
-          </p:cNvSpPr>
-          <p:nvPr>
-            <p:ph type="title"/>
-          </p:nvPr>
-        </p:nvSpPr>
-        <p:spPr/>
-        <p:txBody>
-          <a:bodyPr/>
-          <a:lstStyle/>
-          <a:p>
-            <a:endParaRPr lang="en-US"/>
-          </a:p>
-        </p:txBody>
-      </p:sp>
-      <p:sp>
-        <p:nvSpPr>
-          <p:cNvPr id="3" name="Content Placeholder 2"/>
-          <p:cNvSpPr>
-            <a:spLocks noGrp="1"/>
-          </p:cNvSpPr>
-          <p:nvPr>
-            <p:ph idx="1"/>
-          </p:nvPr>
-        </p:nvSpPr>
-        <p:spPr/>
-        <p:txBody>
-          <a:bodyPr/>
-          <a:lstStyle/>
-          <a:p>
-            <a:endParaRPr lang="en-US"/>
-          </a:p>
-        </p:txBody>
-      </p:sp>
-      <p:sp>
-        <p:nvSpPr>
-          <p:cNvPr id="4" name="Slide Number Placeholder 3"/>
-          <p:cNvSpPr>
-            <a:spLocks noGrp="1"/>
-          </p:cNvSpPr>
-          <p:nvPr>
-            <p:ph type="sldNum" sz="quarter" idx="12"/>
-          </p:nvPr>
-        </p:nvSpPr>
-        <p:spPr/>
-        <p:txBody>
-          <a:bodyPr/>
-          <a:lstStyle/>
-          <a:p>
-            <a:fld id="{E81C4A6D-0315-4A09-8D5A-3A65F767D07B}" type="slidenum">
-              <a:rPr lang="de-DE" smtClean="0"/>
-              <a:t>27</a:t>
-            </a:fld>
-            <a:endParaRPr lang="de-DE"/>
-          </a:p>
-        </p:txBody>
-      </p:sp>
-    </p:spTree>
-    <p:extLst>
-      <p:ext uri="{BB962C8B-B14F-4D97-AF65-F5344CB8AC3E}">
-        <p14:creationId xmlns:p14="http://schemas.microsoft.com/office/powerpoint/2010/main" val="3748320143"/>
-      </p:ext>
-    </p:extLst>
-  </p:cSld>
-  <p:clrMapOvr>
-    <a:masterClrMapping/>
-  </p:clrMapOvr>
-</p:sld>
-</file>
-
-<file path=ppt/slides/slide28.xml><?xml version="1.0" encoding="utf-8"?>
-<p:sld xmlns:a="http://schemas.openxmlformats.org/drawingml/2006/main" xmlns:r="http://schemas.openxmlformats.org/officeDocument/2006/relationships" xmlns:p="http://schemas.openxmlformats.org/presentationml/2006/main">
-  <p:cSld>
-    <p:spTree>
-      <p:nvGrpSpPr>
-        <p:cNvPr id="1" name=""/>
-        <p:cNvGrpSpPr/>
-        <p:nvPr/>
-      </p:nvGrpSpPr>
-      <p:grpSpPr>
-        <a:xfrm>
-          <a:off x="0" y="0"/>
-          <a:ext cx="0" cy="0"/>
-          <a:chOff x="0" y="0"/>
-          <a:chExt cx="0" cy="0"/>
-        </a:xfrm>
-      </p:grpSpPr>
-      <p:sp>
-        <p:nvSpPr>
           <p:cNvPr id="2" name="Titel 1"/>
           <p:cNvSpPr>
             <a:spLocks noGrp="1"/>
@@ -10644,7 +10688,7 @@
           <a:p>
             <a:fld id="{E81C4A6D-0315-4A09-8D5A-3A65F767D07B}" type="slidenum">
               <a:rPr lang="de-DE" smtClean="0"/>
-              <a:t>28</a:t>
+              <a:t>27</a:t>
             </a:fld>
             <a:endParaRPr lang="de-DE"/>
           </a:p>

</xml_diff>